<commit_message>
HeightMap, Character Controller Updates, More Resource
Played around with the height map generation, updated the character
controller to turn and go  up hills properly, add some more base
resources
</commit_message>
<xml_diff>
--- a/Presentation-1-September15.pptx
+++ b/Presentation-1-September15.pptx
@@ -10,11 +10,11 @@
     <p:sldId id="257" r:id="rId4"/>
     <p:sldId id="258" r:id="rId5"/>
     <p:sldId id="259" r:id="rId6"/>
-    <p:sldId id="260" r:id="rId7"/>
-    <p:sldId id="261" r:id="rId8"/>
-    <p:sldId id="262" r:id="rId9"/>
+    <p:sldId id="261" r:id="rId7"/>
+    <p:sldId id="260" r:id="rId8"/>
+    <p:sldId id="264" r:id="rId9"/>
     <p:sldId id="263" r:id="rId10"/>
-    <p:sldId id="264" r:id="rId11"/>
+    <p:sldId id="262" r:id="rId11"/>
   </p:sldIdLst>
   <p:sldSz cx="12192000" cy="6858000"/>
   <p:notesSz cx="7772400" cy="10058400"/>
@@ -113,6 +113,11 @@
       </a:defRPr>
     </a:lvl9pPr>
   </p:defaultTextStyle>
+  <p:extLst>
+    <p:ext uri="{EFAFB233-063F-42B5-8137-9DF3F51BA10A}">
+      <p15:sldGuideLst xmlns:p15="http://schemas.microsoft.com/office/powerpoint/2012/main"/>
+    </p:ext>
+  </p:extLst>
 </p:presentation>
 </file>
 
@@ -6649,7 +6654,7 @@
       </p:grpSpPr>
       <p:sp>
         <p:nvSpPr>
-          <p:cNvPr id="92" name="TextShape 1"/>
+          <p:cNvPr id="117" name="TextShape 1"/>
           <p:cNvSpPr txBox="1"/>
           <p:nvPr/>
         </p:nvSpPr>
@@ -6687,7 +6692,7 @@
                 </a:uFill>
                 <a:latin typeface="Century Schoolbook"/>
               </a:rPr>
-              <a:t>Decision Tree</a:t>
+              <a:t>Level Design</a:t>
             </a:r>
             <a:endParaRPr lang="en-US" sz="1800" b="0" strike="noStrike" spc="-1">
               <a:solidFill>
@@ -6705,58 +6710,41 @@
       </p:sp>
       <p:sp>
         <p:nvSpPr>
-          <p:cNvPr id="93" name="CustomShape 2"/>
-          <p:cNvSpPr/>
+          <p:cNvPr id="118" name="TextShape 2"/>
+          <p:cNvSpPr txBox="1"/>
           <p:nvPr/>
         </p:nvSpPr>
         <p:spPr>
           <a:xfrm>
-            <a:off x="5181480" y="4695120"/>
-            <a:ext cx="6248160" cy="693000"/>
-          </a:xfrm>
-          <a:prstGeom prst="roundRect">
-            <a:avLst>
-              <a:gd name="adj" fmla="val 10000"/>
-            </a:avLst>
+            <a:off x="5181480" y="569160"/>
+            <a:ext cx="6248160" cy="5654880"/>
+          </a:xfrm>
+          <a:prstGeom prst="rect">
+            <a:avLst/>
           </a:prstGeom>
-          <a:solidFill>
-            <a:schemeClr val="accent2">
-              <a:tint val="40000"/>
-              <a:hueOff val="0"/>
-              <a:satOff val="0"/>
-              <a:lumOff val="0"/>
-              <a:alphaOff val="0"/>
-            </a:schemeClr>
-          </a:solidFill>
+          <a:noFill/>
           <a:ln>
             <a:noFill/>
           </a:ln>
         </p:spPr>
-        <p:style>
-          <a:lnRef idx="0">
-            <a:scrgbClr r="0" g="0" b="0"/>
-          </a:lnRef>
-          <a:fillRef idx="0">
-            <a:scrgbClr r="0" g="0" b="0"/>
-          </a:fillRef>
-          <a:effectRef idx="0">
-            <a:scrgbClr r="0" g="0" b="0"/>
-          </a:effectRef>
-          <a:fontRef idx="minor"/>
-        </p:style>
         <p:txBody>
-          <a:bodyPr lIns="170640" tIns="170640" rIns="170640" bIns="170640" anchor="ctr"/>
+          <a:bodyPr/>
           <a:lstStyle/>
           <a:p>
-            <a:pPr algn="ctr">
+            <a:pPr marL="283320" indent="-282960">
               <a:lnSpc>
-                <a:spcPct val="90000"/>
+                <a:spcPct val="112000"/>
               </a:lnSpc>
+              <a:buClr>
+                <a:srgbClr val="262626"/>
+              </a:buClr>
+              <a:buFont typeface="Arial"/>
+              <a:buChar char="•"/>
             </a:pPr>
             <a:r>
-              <a:rPr lang="en-US" sz="2400" b="0" strike="noStrike" spc="-1">
-                <a:solidFill>
-                  <a:srgbClr val="000000"/>
+              <a:rPr lang="en-US" sz="2000" b="0" strike="noStrike" spc="-1">
+                <a:solidFill>
+                  <a:srgbClr val="262626"/>
                 </a:solidFill>
                 <a:uFill>
                   <a:solidFill>
@@ -6765,76 +6753,24 @@
                 </a:uFill>
                 <a:latin typeface="Corbel"/>
               </a:rPr>
-              <a:t>Late Game</a:t>
+              <a:t>Four regions (one for each corner) randomly selected:</a:t>
             </a:r>
-            <a:endParaRPr lang="en-US" sz="1800" b="0" strike="noStrike" spc="-1">
-              <a:solidFill>
-                <a:srgbClr val="000000"/>
-              </a:solidFill>
-              <a:uFill>
-                <a:solidFill>
-                  <a:srgbClr val="FFFFFF"/>
-                </a:solidFill>
-              </a:uFill>
-              <a:latin typeface="Arial"/>
-            </a:endParaRPr>
-          </a:p>
-        </p:txBody>
-      </p:sp>
-      <p:sp>
-        <p:nvSpPr>
-          <p:cNvPr id="94" name="CustomShape 3"/>
-          <p:cNvSpPr/>
-          <p:nvPr/>
-        </p:nvSpPr>
-        <p:spPr>
-          <a:xfrm>
-            <a:off x="5181480" y="3022560"/>
-            <a:ext cx="6248160" cy="1556640"/>
-          </a:xfrm>
-          <a:prstGeom prst="roundRect">
-            <a:avLst>
-              <a:gd name="adj" fmla="val 10000"/>
-            </a:avLst>
-          </a:prstGeom>
-          <a:solidFill>
-            <a:schemeClr val="accent2">
-              <a:tint val="40000"/>
-              <a:hueOff val="0"/>
-              <a:satOff val="0"/>
-              <a:lumOff val="0"/>
-              <a:alphaOff val="0"/>
-            </a:schemeClr>
-          </a:solidFill>
-          <a:ln>
-            <a:noFill/>
-          </a:ln>
-        </p:spPr>
-        <p:style>
-          <a:lnRef idx="0">
-            <a:scrgbClr r="0" g="0" b="0"/>
-          </a:lnRef>
-          <a:fillRef idx="0">
-            <a:scrgbClr r="0" g="0" b="0"/>
-          </a:fillRef>
-          <a:effectRef idx="0">
-            <a:scrgbClr r="0" g="0" b="0"/>
-          </a:effectRef>
-          <a:fontRef idx="minor"/>
-        </p:style>
-        <p:txBody>
-          <a:bodyPr lIns="170640" tIns="170640" rIns="170640" bIns="170640" anchor="ctr"/>
-          <a:lstStyle/>
-          <a:p>
-            <a:pPr algn="ctr">
+          </a:p>
+          <a:p>
+            <a:pPr marL="685800" lvl="1" indent="-282960">
               <a:lnSpc>
-                <a:spcPct val="90000"/>
+                <a:spcPct val="100000"/>
               </a:lnSpc>
+              <a:buClr>
+                <a:srgbClr val="262626"/>
+              </a:buClr>
+              <a:buFont typeface="Corbel"/>
+              <a:buChar char="–"/>
             </a:pPr>
             <a:r>
-              <a:rPr lang="en-US" sz="2400" b="0" strike="noStrike" spc="-1">
-                <a:solidFill>
-                  <a:srgbClr val="000000"/>
+              <a:rPr lang="en-US" sz="1800" b="0" strike="noStrike" spc="-1">
+                <a:solidFill>
+                  <a:srgbClr val="262626"/>
                 </a:solidFill>
                 <a:uFill>
                   <a:solidFill>
@@ -6843,76 +6779,35 @@
                 </a:uFill>
                 <a:latin typeface="Corbel"/>
               </a:rPr>
-              <a:t>Early Game</a:t>
+              <a:t>Mountains</a:t>
             </a:r>
-            <a:endParaRPr lang="en-US" sz="1800" b="0" strike="noStrike" spc="-1">
+            <a:endParaRPr lang="en-US" sz="1600" b="0" strike="noStrike" spc="-1">
               <a:solidFill>
-                <a:srgbClr val="000000"/>
+                <a:srgbClr val="262626"/>
               </a:solidFill>
               <a:uFill>
                 <a:solidFill>
                   <a:srgbClr val="FFFFFF"/>
                 </a:solidFill>
               </a:uFill>
-              <a:latin typeface="Arial"/>
+              <a:latin typeface="Corbel"/>
             </a:endParaRPr>
           </a:p>
-        </p:txBody>
-      </p:sp>
-      <p:sp>
-        <p:nvSpPr>
-          <p:cNvPr id="95" name="CustomShape 4"/>
-          <p:cNvSpPr/>
-          <p:nvPr/>
-        </p:nvSpPr>
-        <p:spPr>
-          <a:xfrm>
-            <a:off x="5181480" y="1404720"/>
-            <a:ext cx="6248160" cy="1501920"/>
-          </a:xfrm>
-          <a:prstGeom prst="roundRect">
-            <a:avLst>
-              <a:gd name="adj" fmla="val 10000"/>
-            </a:avLst>
-          </a:prstGeom>
-          <a:solidFill>
-            <a:schemeClr val="accent2">
-              <a:tint val="40000"/>
-              <a:hueOff val="0"/>
-              <a:satOff val="0"/>
-              <a:lumOff val="0"/>
-              <a:alphaOff val="0"/>
-            </a:schemeClr>
-          </a:solidFill>
-          <a:ln>
-            <a:noFill/>
-          </a:ln>
-        </p:spPr>
-        <p:style>
-          <a:lnRef idx="0">
-            <a:scrgbClr r="0" g="0" b="0"/>
-          </a:lnRef>
-          <a:fillRef idx="0">
-            <a:scrgbClr r="0" g="0" b="0"/>
-          </a:fillRef>
-          <a:effectRef idx="0">
-            <a:scrgbClr r="0" g="0" b="0"/>
-          </a:effectRef>
-          <a:fontRef idx="minor"/>
-        </p:style>
-        <p:txBody>
-          <a:bodyPr lIns="170640" tIns="170640" rIns="170640" bIns="170640" anchor="ctr"/>
-          <a:lstStyle/>
-          <a:p>
-            <a:pPr algn="ctr">
+          <a:p>
+            <a:pPr marL="685800" lvl="1" indent="-282960">
               <a:lnSpc>
-                <a:spcPct val="90000"/>
+                <a:spcPct val="100000"/>
               </a:lnSpc>
+              <a:buClr>
+                <a:srgbClr val="262626"/>
+              </a:buClr>
+              <a:buFont typeface="Corbel"/>
+              <a:buChar char="–"/>
             </a:pPr>
             <a:r>
-              <a:rPr lang="en-US" sz="2400" b="0" strike="noStrike" spc="-1">
-                <a:solidFill>
-                  <a:srgbClr val="000000"/>
+              <a:rPr lang="en-US" sz="1800" b="0" strike="noStrike" spc="-1">
+                <a:solidFill>
+                  <a:srgbClr val="262626"/>
                 </a:solidFill>
                 <a:uFill>
                   <a:solidFill>
@@ -6921,83 +6816,35 @@
                 </a:uFill>
                 <a:latin typeface="Corbel"/>
               </a:rPr>
-              <a:t>Pre-Game</a:t>
+              <a:t>Forest</a:t>
             </a:r>
-            <a:endParaRPr lang="en-US" sz="1800" b="0" strike="noStrike" spc="-1">
+            <a:endParaRPr lang="en-US" sz="1600" b="0" strike="noStrike" spc="-1">
               <a:solidFill>
-                <a:srgbClr val="000000"/>
+                <a:srgbClr val="262626"/>
               </a:solidFill>
               <a:uFill>
                 <a:solidFill>
                   <a:srgbClr val="FFFFFF"/>
                 </a:solidFill>
               </a:uFill>
-              <a:latin typeface="Arial"/>
+              <a:latin typeface="Corbel"/>
             </a:endParaRPr>
           </a:p>
-        </p:txBody>
-      </p:sp>
-      <p:sp>
-        <p:nvSpPr>
-          <p:cNvPr id="96" name="CustomShape 5"/>
-          <p:cNvSpPr/>
-          <p:nvPr/>
-        </p:nvSpPr>
-        <p:spPr>
-          <a:xfrm>
-            <a:off x="8747280" y="1462320"/>
-            <a:ext cx="866160" cy="577440"/>
-          </a:xfrm>
-          <a:prstGeom prst="roundRect">
-            <a:avLst>
-              <a:gd name="adj" fmla="val 10000"/>
-            </a:avLst>
-          </a:prstGeom>
-          <a:solidFill>
-            <a:schemeClr val="accent1">
-              <a:hueOff val="0"/>
-              <a:satOff val="0"/>
-              <a:lumOff val="0"/>
-              <a:alphaOff val="0"/>
-            </a:schemeClr>
-          </a:solidFill>
-          <a:ln>
-            <a:solidFill>
-              <a:schemeClr val="lt1">
-                <a:hueOff val="0"/>
-                <a:satOff val="0"/>
-                <a:lumOff val="0"/>
-                <a:alphaOff val="0"/>
-              </a:schemeClr>
-            </a:solidFill>
-            <a:round/>
-          </a:ln>
-        </p:spPr>
-        <p:style>
-          <a:lnRef idx="2">
-            <a:scrgbClr r="0" g="0" b="0"/>
-          </a:lnRef>
-          <a:fillRef idx="0">
-            <a:scrgbClr r="0" g="0" b="0"/>
-          </a:fillRef>
-          <a:effectRef idx="0">
-            <a:scrgbClr r="0" g="0" b="0"/>
-          </a:effectRef>
-          <a:fontRef idx="minor"/>
-        </p:style>
-        <p:txBody>
-          <a:bodyPr lIns="58680" tIns="58680" rIns="41760" bIns="58680" anchor="ctr"/>
-          <a:lstStyle/>
-          <a:p>
-            <a:pPr algn="ctr">
+          <a:p>
+            <a:pPr marL="685800" lvl="1" indent="-282960">
               <a:lnSpc>
-                <a:spcPct val="90000"/>
+                <a:spcPct val="100000"/>
               </a:lnSpc>
+              <a:buClr>
+                <a:srgbClr val="262626"/>
+              </a:buClr>
+              <a:buFont typeface="Corbel"/>
+              <a:buChar char="–"/>
             </a:pPr>
             <a:r>
-              <a:rPr lang="en-US" sz="1100" b="0" strike="noStrike" spc="-1">
-                <a:solidFill>
-                  <a:srgbClr val="FFFFFF"/>
+              <a:rPr lang="en-US" sz="1800" b="0" strike="noStrike" spc="-1">
+                <a:solidFill>
+                  <a:srgbClr val="262626"/>
                 </a:solidFill>
                 <a:uFill>
                   <a:solidFill>
@@ -7006,137 +6853,35 @@
                 </a:uFill>
                 <a:latin typeface="Corbel"/>
               </a:rPr>
-              <a:t>Team Composition</a:t>
+              <a:t>Desert</a:t>
             </a:r>
-            <a:endParaRPr lang="en-US" sz="1800" b="0" strike="noStrike" spc="-1">
+            <a:endParaRPr lang="en-US" sz="1600" b="0" strike="noStrike" spc="-1">
               <a:solidFill>
-                <a:srgbClr val="000000"/>
+                <a:srgbClr val="262626"/>
               </a:solidFill>
               <a:uFill>
                 <a:solidFill>
                   <a:srgbClr val="FFFFFF"/>
                 </a:solidFill>
               </a:uFill>
-              <a:latin typeface="Arial"/>
+              <a:latin typeface="Corbel"/>
             </a:endParaRPr>
           </a:p>
-        </p:txBody>
-      </p:sp>
-      <p:sp>
-        <p:nvSpPr>
-          <p:cNvPr id="97" name="CustomShape 6"/>
-          <p:cNvSpPr/>
-          <p:nvPr/>
-        </p:nvSpPr>
-        <p:spPr>
-          <a:xfrm>
-            <a:off x="9135000" y="2040120"/>
-            <a:ext cx="91080" cy="230760"/>
-          </a:xfrm>
-          <a:custGeom>
-            <a:avLst/>
-            <a:gdLst/>
-            <a:ahLst/>
-            <a:cxnLst/>
-            <a:rect l="l" t="t" r="r" b="b"/>
-            <a:pathLst>
-              <a:path h="231060">
-                <a:moveTo>
-                  <a:pt x="45720" y="0"/>
-                </a:moveTo>
-                <a:lnTo>
-                  <a:pt x="45720" y="231060"/>
-                </a:lnTo>
-              </a:path>
-            </a:pathLst>
-          </a:custGeom>
-          <a:noFill/>
-          <a:ln>
-            <a:solidFill>
-              <a:schemeClr val="accent2">
-                <a:hueOff val="0"/>
-                <a:satOff val="0"/>
-                <a:lumOff val="0"/>
-                <a:alphaOff val="0"/>
-              </a:schemeClr>
-            </a:solidFill>
-            <a:round/>
-          </a:ln>
-        </p:spPr>
-        <p:style>
-          <a:lnRef idx="2">
-            <a:scrgbClr r="0" g="0" b="0"/>
-          </a:lnRef>
-          <a:fillRef idx="0">
-            <a:scrgbClr r="0" g="0" b="0"/>
-          </a:fillRef>
-          <a:effectRef idx="0">
-            <a:scrgbClr r="0" g="0" b="0"/>
-          </a:effectRef>
-          <a:fontRef idx="minor"/>
-        </p:style>
-      </p:sp>
-      <p:sp>
-        <p:nvSpPr>
-          <p:cNvPr id="98" name="CustomShape 7"/>
-          <p:cNvSpPr/>
-          <p:nvPr/>
-        </p:nvSpPr>
-        <p:spPr>
-          <a:xfrm>
-            <a:off x="8747280" y="2271240"/>
-            <a:ext cx="866160" cy="577440"/>
-          </a:xfrm>
-          <a:prstGeom prst="roundRect">
-            <a:avLst>
-              <a:gd name="adj" fmla="val 10000"/>
-            </a:avLst>
-          </a:prstGeom>
-          <a:solidFill>
-            <a:schemeClr val="accent2">
-              <a:hueOff val="0"/>
-              <a:satOff val="0"/>
-              <a:lumOff val="0"/>
-              <a:alphaOff val="0"/>
-            </a:schemeClr>
-          </a:solidFill>
-          <a:ln>
-            <a:solidFill>
-              <a:schemeClr val="lt1">
-                <a:hueOff val="0"/>
-                <a:satOff val="0"/>
-                <a:lumOff val="0"/>
-                <a:alphaOff val="0"/>
-              </a:schemeClr>
-            </a:solidFill>
-            <a:round/>
-          </a:ln>
-        </p:spPr>
-        <p:style>
-          <a:lnRef idx="2">
-            <a:scrgbClr r="0" g="0" b="0"/>
-          </a:lnRef>
-          <a:fillRef idx="0">
-            <a:scrgbClr r="0" g="0" b="0"/>
-          </a:fillRef>
-          <a:effectRef idx="0">
-            <a:scrgbClr r="0" g="0" b="0"/>
-          </a:effectRef>
-          <a:fontRef idx="minor"/>
-        </p:style>
-        <p:txBody>
-          <a:bodyPr lIns="58680" tIns="58680" rIns="41760" bIns="58680" anchor="ctr"/>
-          <a:lstStyle/>
-          <a:p>
-            <a:pPr algn="ctr">
+          <a:p>
+            <a:pPr marL="685800" lvl="1" indent="-282960">
               <a:lnSpc>
-                <a:spcPct val="90000"/>
+                <a:spcPct val="100000"/>
               </a:lnSpc>
+              <a:buClr>
+                <a:srgbClr val="262626"/>
+              </a:buClr>
+              <a:buFont typeface="Corbel"/>
+              <a:buChar char="–"/>
             </a:pPr>
             <a:r>
-              <a:rPr lang="en-US" sz="1100" b="0" strike="noStrike" spc="-1">
-                <a:solidFill>
-                  <a:srgbClr val="FFFFFF"/>
+              <a:rPr lang="en-US" sz="1800" b="0" strike="noStrike" spc="-1">
+                <a:solidFill>
+                  <a:srgbClr val="262626"/>
                 </a:solidFill>
                 <a:uFill>
                   <a:solidFill>
@@ -7145,143 +6890,35 @@
                 </a:uFill>
                 <a:latin typeface="Corbel"/>
               </a:rPr>
-              <a:t>Character Selection</a:t>
+              <a:t>Swamp</a:t>
             </a:r>
-            <a:endParaRPr lang="en-US" sz="1800" b="0" strike="noStrike" spc="-1">
+            <a:endParaRPr lang="en-US" sz="1600" b="0" strike="noStrike" spc="-1">
               <a:solidFill>
-                <a:srgbClr val="000000"/>
+                <a:srgbClr val="262626"/>
               </a:solidFill>
               <a:uFill>
                 <a:solidFill>
                   <a:srgbClr val="FFFFFF"/>
                 </a:solidFill>
               </a:uFill>
-              <a:latin typeface="Arial"/>
+              <a:latin typeface="Corbel"/>
             </a:endParaRPr>
           </a:p>
-        </p:txBody>
-      </p:sp>
-      <p:sp>
-        <p:nvSpPr>
-          <p:cNvPr id="99" name="CustomShape 8"/>
-          <p:cNvSpPr/>
-          <p:nvPr/>
-        </p:nvSpPr>
-        <p:spPr>
-          <a:xfrm>
-            <a:off x="8054280" y="2848680"/>
-            <a:ext cx="1126080" cy="230760"/>
-          </a:xfrm>
-          <a:custGeom>
-            <a:avLst/>
-            <a:gdLst/>
-            <a:ahLst/>
-            <a:cxnLst/>
-            <a:rect l="l" t="t" r="r" b="b"/>
-            <a:pathLst>
-              <a:path w="1126420" h="231060">
-                <a:moveTo>
-                  <a:pt x="1126420" y="0"/>
-                </a:moveTo>
-                <a:lnTo>
-                  <a:pt x="1126420" y="115530"/>
-                </a:lnTo>
-                <a:lnTo>
-                  <a:pt x="0" y="115530"/>
-                </a:lnTo>
-                <a:lnTo>
-                  <a:pt x="0" y="231060"/>
-                </a:lnTo>
-              </a:path>
-            </a:pathLst>
-          </a:custGeom>
-          <a:noFill/>
-          <a:ln>
-            <a:solidFill>
-              <a:schemeClr val="accent3">
-                <a:hueOff val="0"/>
-                <a:satOff val="0"/>
-                <a:lumOff val="0"/>
-                <a:alphaOff val="0"/>
-              </a:schemeClr>
-            </a:solidFill>
-            <a:round/>
-          </a:ln>
-        </p:spPr>
-        <p:style>
-          <a:lnRef idx="2">
-            <a:scrgbClr r="0" g="0" b="0"/>
-          </a:lnRef>
-          <a:fillRef idx="0">
-            <a:scrgbClr r="0" g="0" b="0"/>
-          </a:fillRef>
-          <a:effectRef idx="0">
-            <a:scrgbClr r="0" g="0" b="0"/>
-          </a:effectRef>
-          <a:fontRef idx="minor"/>
-        </p:style>
-      </p:sp>
-      <p:sp>
-        <p:nvSpPr>
-          <p:cNvPr id="100" name="CustomShape 9"/>
-          <p:cNvSpPr/>
-          <p:nvPr/>
-        </p:nvSpPr>
-        <p:spPr>
-          <a:xfrm>
-            <a:off x="7620840" y="3079800"/>
-            <a:ext cx="866160" cy="577440"/>
-          </a:xfrm>
-          <a:prstGeom prst="roundRect">
-            <a:avLst>
-              <a:gd name="adj" fmla="val 10000"/>
-            </a:avLst>
-          </a:prstGeom>
-          <a:solidFill>
-            <a:schemeClr val="accent3">
-              <a:hueOff val="0"/>
-              <a:satOff val="0"/>
-              <a:lumOff val="0"/>
-              <a:alphaOff val="0"/>
-            </a:schemeClr>
-          </a:solidFill>
-          <a:ln>
-            <a:solidFill>
-              <a:schemeClr val="lt1">
-                <a:hueOff val="0"/>
-                <a:satOff val="0"/>
-                <a:lumOff val="0"/>
-                <a:alphaOff val="0"/>
-              </a:schemeClr>
-            </a:solidFill>
-            <a:round/>
-          </a:ln>
-        </p:spPr>
-        <p:style>
-          <a:lnRef idx="2">
-            <a:scrgbClr r="0" g="0" b="0"/>
-          </a:lnRef>
-          <a:fillRef idx="0">
-            <a:scrgbClr r="0" g="0" b="0"/>
-          </a:fillRef>
-          <a:effectRef idx="0">
-            <a:scrgbClr r="0" g="0" b="0"/>
-          </a:effectRef>
-          <a:fontRef idx="minor"/>
-        </p:style>
-        <p:txBody>
-          <a:bodyPr lIns="58680" tIns="58680" rIns="41760" bIns="58680" anchor="ctr"/>
-          <a:lstStyle/>
-          <a:p>
-            <a:pPr algn="ctr">
+          <a:p>
+            <a:pPr marL="685800" lvl="1" indent="-282960">
               <a:lnSpc>
-                <a:spcPct val="90000"/>
+                <a:spcPct val="100000"/>
               </a:lnSpc>
+              <a:buClr>
+                <a:srgbClr val="262626"/>
+              </a:buClr>
+              <a:buFont typeface="Corbel"/>
+              <a:buChar char="–"/>
             </a:pPr>
             <a:r>
-              <a:rPr lang="en-US" sz="1100" b="0" strike="noStrike" spc="-1">
-                <a:solidFill>
-                  <a:srgbClr val="FFFFFF"/>
+              <a:rPr lang="en-US" sz="1800" b="0" strike="noStrike" spc="-1">
+                <a:solidFill>
+                  <a:srgbClr val="262626"/>
                 </a:solidFill>
                 <a:uFill>
                   <a:solidFill>
@@ -7290,143 +6927,35 @@
                 </a:uFill>
                 <a:latin typeface="Corbel"/>
               </a:rPr>
-              <a:t>Abilities</a:t>
+              <a:t>Coast</a:t>
             </a:r>
-            <a:endParaRPr lang="en-US" sz="1800" b="0" strike="noStrike" spc="-1">
+            <a:endParaRPr lang="en-US" sz="1600" b="0" strike="noStrike" spc="-1">
               <a:solidFill>
-                <a:srgbClr val="000000"/>
+                <a:srgbClr val="262626"/>
               </a:solidFill>
               <a:uFill>
                 <a:solidFill>
                   <a:srgbClr val="FFFFFF"/>
                 </a:solidFill>
               </a:uFill>
-              <a:latin typeface="Arial"/>
+              <a:latin typeface="Corbel"/>
             </a:endParaRPr>
           </a:p>
-        </p:txBody>
-      </p:sp>
-      <p:sp>
-        <p:nvSpPr>
-          <p:cNvPr id="101" name="CustomShape 10"/>
-          <p:cNvSpPr/>
-          <p:nvPr/>
-        </p:nvSpPr>
-        <p:spPr>
-          <a:xfrm>
-            <a:off x="7490880" y="3657600"/>
-            <a:ext cx="562680" cy="230760"/>
-          </a:xfrm>
-          <a:custGeom>
-            <a:avLst/>
-            <a:gdLst/>
-            <a:ahLst/>
-            <a:cxnLst/>
-            <a:rect l="l" t="t" r="r" b="b"/>
-            <a:pathLst>
-              <a:path w="563210" h="231060">
-                <a:moveTo>
-                  <a:pt x="563210" y="0"/>
-                </a:moveTo>
-                <a:lnTo>
-                  <a:pt x="563210" y="115530"/>
-                </a:lnTo>
-                <a:lnTo>
-                  <a:pt x="0" y="115530"/>
-                </a:lnTo>
-                <a:lnTo>
-                  <a:pt x="0" y="231060"/>
-                </a:lnTo>
-              </a:path>
-            </a:pathLst>
-          </a:custGeom>
-          <a:noFill/>
-          <a:ln>
-            <a:solidFill>
-              <a:schemeClr val="accent4">
-                <a:hueOff val="0"/>
-                <a:satOff val="0"/>
-                <a:lumOff val="0"/>
-                <a:alphaOff val="0"/>
-              </a:schemeClr>
-            </a:solidFill>
-            <a:round/>
-          </a:ln>
-        </p:spPr>
-        <p:style>
-          <a:lnRef idx="2">
-            <a:scrgbClr r="0" g="0" b="0"/>
-          </a:lnRef>
-          <a:fillRef idx="0">
-            <a:scrgbClr r="0" g="0" b="0"/>
-          </a:fillRef>
-          <a:effectRef idx="0">
-            <a:scrgbClr r="0" g="0" b="0"/>
-          </a:effectRef>
-          <a:fontRef idx="minor"/>
-        </p:style>
-      </p:sp>
-      <p:sp>
-        <p:nvSpPr>
-          <p:cNvPr id="102" name="CustomShape 11"/>
-          <p:cNvSpPr/>
-          <p:nvPr/>
-        </p:nvSpPr>
-        <p:spPr>
-          <a:xfrm>
-            <a:off x="7057800" y="3888720"/>
-            <a:ext cx="866160" cy="577440"/>
-          </a:xfrm>
-          <a:prstGeom prst="roundRect">
-            <a:avLst>
-              <a:gd name="adj" fmla="val 10000"/>
-            </a:avLst>
-          </a:prstGeom>
-          <a:solidFill>
-            <a:schemeClr val="accent4">
-              <a:hueOff val="0"/>
-              <a:satOff val="0"/>
-              <a:lumOff val="0"/>
-              <a:alphaOff val="0"/>
-            </a:schemeClr>
-          </a:solidFill>
-          <a:ln>
-            <a:solidFill>
-              <a:schemeClr val="lt1">
-                <a:hueOff val="0"/>
-                <a:satOff val="0"/>
-                <a:lumOff val="0"/>
-                <a:alphaOff val="0"/>
-              </a:schemeClr>
-            </a:solidFill>
-            <a:round/>
-          </a:ln>
-        </p:spPr>
-        <p:style>
-          <a:lnRef idx="2">
-            <a:scrgbClr r="0" g="0" b="0"/>
-          </a:lnRef>
-          <a:fillRef idx="0">
-            <a:scrgbClr r="0" g="0" b="0"/>
-          </a:fillRef>
-          <a:effectRef idx="0">
-            <a:scrgbClr r="0" g="0" b="0"/>
-          </a:effectRef>
-          <a:fontRef idx="minor"/>
-        </p:style>
-        <p:txBody>
-          <a:bodyPr lIns="58680" tIns="58680" rIns="41760" bIns="58680" anchor="ctr"/>
-          <a:lstStyle/>
-          <a:p>
-            <a:pPr algn="ctr">
+          <a:p>
+            <a:pPr marL="283320" indent="-282960">
               <a:lnSpc>
-                <a:spcPct val="90000"/>
+                <a:spcPct val="112000"/>
               </a:lnSpc>
+              <a:buClr>
+                <a:srgbClr val="262626"/>
+              </a:buClr>
+              <a:buFont typeface="Arial"/>
+              <a:buChar char="•"/>
             </a:pPr>
             <a:r>
-              <a:rPr lang="en-US" sz="1100" b="0" strike="noStrike" spc="-1">
-                <a:solidFill>
-                  <a:srgbClr val="FFFFFF"/>
+              <a:rPr lang="en-US" sz="2000" b="0" strike="noStrike" spc="-1">
+                <a:solidFill>
+                  <a:srgbClr val="262626"/>
                 </a:solidFill>
                 <a:uFill>
                   <a:solidFill>
@@ -7435,143 +6964,24 @@
                 </a:uFill>
                 <a:latin typeface="Corbel"/>
               </a:rPr>
-              <a:t>Personal Goal</a:t>
+              <a:t>The center is open grassland</a:t>
             </a:r>
-            <a:endParaRPr lang="en-US" sz="1800" b="0" strike="noStrike" spc="-1">
-              <a:solidFill>
-                <a:srgbClr val="000000"/>
-              </a:solidFill>
-              <a:uFill>
-                <a:solidFill>
-                  <a:srgbClr val="FFFFFF"/>
-                </a:solidFill>
-              </a:uFill>
-              <a:latin typeface="Arial"/>
-            </a:endParaRPr>
-          </a:p>
-        </p:txBody>
-      </p:sp>
-      <p:sp>
-        <p:nvSpPr>
-          <p:cNvPr id="103" name="CustomShape 12"/>
-          <p:cNvSpPr/>
-          <p:nvPr/>
-        </p:nvSpPr>
-        <p:spPr>
-          <a:xfrm>
-            <a:off x="8054280" y="3657600"/>
-            <a:ext cx="562680" cy="230760"/>
-          </a:xfrm>
-          <a:custGeom>
-            <a:avLst/>
-            <a:gdLst/>
-            <a:ahLst/>
-            <a:cxnLst/>
-            <a:rect l="l" t="t" r="r" b="b"/>
-            <a:pathLst>
-              <a:path w="563210" h="231060">
-                <a:moveTo>
-                  <a:pt x="0" y="0"/>
-                </a:moveTo>
-                <a:lnTo>
-                  <a:pt x="0" y="115530"/>
-                </a:lnTo>
-                <a:lnTo>
-                  <a:pt x="563210" y="115530"/>
-                </a:lnTo>
-                <a:lnTo>
-                  <a:pt x="563210" y="231060"/>
-                </a:lnTo>
-              </a:path>
-            </a:pathLst>
-          </a:custGeom>
-          <a:noFill/>
-          <a:ln>
-            <a:solidFill>
-              <a:schemeClr val="accent4">
-                <a:hueOff val="0"/>
-                <a:satOff val="0"/>
-                <a:lumOff val="0"/>
-                <a:alphaOff val="0"/>
-              </a:schemeClr>
-            </a:solidFill>
-            <a:round/>
-          </a:ln>
-        </p:spPr>
-        <p:style>
-          <a:lnRef idx="2">
-            <a:scrgbClr r="0" g="0" b="0"/>
-          </a:lnRef>
-          <a:fillRef idx="0">
-            <a:scrgbClr r="0" g="0" b="0"/>
-          </a:fillRef>
-          <a:effectRef idx="0">
-            <a:scrgbClr r="0" g="0" b="0"/>
-          </a:effectRef>
-          <a:fontRef idx="minor"/>
-        </p:style>
-      </p:sp>
-      <p:sp>
-        <p:nvSpPr>
-          <p:cNvPr id="104" name="CustomShape 13"/>
-          <p:cNvSpPr/>
-          <p:nvPr/>
-        </p:nvSpPr>
-        <p:spPr>
-          <a:xfrm>
-            <a:off x="8184240" y="3888720"/>
-            <a:ext cx="866160" cy="577440"/>
-          </a:xfrm>
-          <a:prstGeom prst="roundRect">
-            <a:avLst>
-              <a:gd name="adj" fmla="val 10000"/>
-            </a:avLst>
-          </a:prstGeom>
-          <a:solidFill>
-            <a:schemeClr val="accent4">
-              <a:hueOff val="0"/>
-              <a:satOff val="0"/>
-              <a:lumOff val="0"/>
-              <a:alphaOff val="0"/>
-            </a:schemeClr>
-          </a:solidFill>
-          <a:ln>
-            <a:solidFill>
-              <a:schemeClr val="lt1">
-                <a:hueOff val="0"/>
-                <a:satOff val="0"/>
-                <a:lumOff val="0"/>
-                <a:alphaOff val="0"/>
-              </a:schemeClr>
-            </a:solidFill>
-            <a:round/>
-          </a:ln>
-        </p:spPr>
-        <p:style>
-          <a:lnRef idx="2">
-            <a:scrgbClr r="0" g="0" b="0"/>
-          </a:lnRef>
-          <a:fillRef idx="0">
-            <a:scrgbClr r="0" g="0" b="0"/>
-          </a:fillRef>
-          <a:effectRef idx="0">
-            <a:scrgbClr r="0" g="0" b="0"/>
-          </a:effectRef>
-          <a:fontRef idx="minor"/>
-        </p:style>
-        <p:txBody>
-          <a:bodyPr lIns="58680" tIns="58680" rIns="41760" bIns="58680" anchor="ctr"/>
-          <a:lstStyle/>
-          <a:p>
-            <a:pPr algn="ctr">
+          </a:p>
+          <a:p>
+            <a:pPr marL="685800" lvl="1" indent="-282960">
               <a:lnSpc>
-                <a:spcPct val="90000"/>
+                <a:spcPct val="100000"/>
               </a:lnSpc>
+              <a:buClr>
+                <a:srgbClr val="262626"/>
+              </a:buClr>
+              <a:buFont typeface="Corbel"/>
+              <a:buChar char="–"/>
             </a:pPr>
             <a:r>
-              <a:rPr lang="en-US" sz="1100" b="0" strike="noStrike" spc="-1">
-                <a:solidFill>
-                  <a:srgbClr val="FFFFFF"/>
+              <a:rPr lang="en-US" sz="1800" b="0" strike="noStrike" spc="-1">
+                <a:solidFill>
+                  <a:srgbClr val="262626"/>
                 </a:solidFill>
                 <a:uFill>
                   <a:solidFill>
@@ -7580,138 +6990,35 @@
                 </a:uFill>
                 <a:latin typeface="Corbel"/>
               </a:rPr>
-              <a:t>Regions</a:t>
+              <a:t>“No man’s land”</a:t>
             </a:r>
-            <a:endParaRPr lang="en-US" sz="1800" b="0" strike="noStrike" spc="-1">
+            <a:endParaRPr lang="en-US" sz="1600" b="0" strike="noStrike" spc="-1">
               <a:solidFill>
-                <a:srgbClr val="000000"/>
+                <a:srgbClr val="262626"/>
               </a:solidFill>
               <a:uFill>
                 <a:solidFill>
                   <a:srgbClr val="FFFFFF"/>
                 </a:solidFill>
               </a:uFill>
-              <a:latin typeface="Arial"/>
+              <a:latin typeface="Corbel"/>
             </a:endParaRPr>
           </a:p>
-        </p:txBody>
-      </p:sp>
-      <p:sp>
-        <p:nvSpPr>
-          <p:cNvPr id="105" name="CustomShape 14"/>
-          <p:cNvSpPr/>
-          <p:nvPr/>
-        </p:nvSpPr>
-        <p:spPr>
-          <a:xfrm>
-            <a:off x="8617320" y="4466160"/>
-            <a:ext cx="642600" cy="272520"/>
-          </a:xfrm>
-          <a:custGeom>
-            <a:avLst/>
-            <a:gdLst/>
-            <a:ahLst/>
-            <a:cxnLst/>
-            <a:rect l="l" t="t" r="r" b="b"/>
-            <a:pathLst>
-              <a:path w="642856" h="272940">
-                <a:moveTo>
-                  <a:pt x="0" y="0"/>
-                </a:moveTo>
-                <a:lnTo>
-                  <a:pt x="0" y="136470"/>
-                </a:lnTo>
-                <a:lnTo>
-                  <a:pt x="642856" y="136470"/>
-                </a:lnTo>
-                <a:lnTo>
-                  <a:pt x="642856" y="272940"/>
-                </a:lnTo>
-              </a:path>
-            </a:pathLst>
-          </a:custGeom>
-          <a:noFill/>
-          <a:ln>
-            <a:solidFill>
-              <a:schemeClr val="accent4">
-                <a:hueOff val="0"/>
-                <a:satOff val="0"/>
-                <a:lumOff val="0"/>
-                <a:alphaOff val="0"/>
-              </a:schemeClr>
-            </a:solidFill>
-            <a:round/>
-          </a:ln>
-        </p:spPr>
-        <p:style>
-          <a:lnRef idx="2">
-            <a:scrgbClr r="0" g="0" b="0"/>
-          </a:lnRef>
-          <a:fillRef idx="0">
-            <a:scrgbClr r="0" g="0" b="0"/>
-          </a:fillRef>
-          <a:effectRef idx="0">
-            <a:scrgbClr r="0" g="0" b="0"/>
-          </a:effectRef>
-          <a:fontRef idx="minor"/>
-        </p:style>
-      </p:sp>
-      <p:sp>
-        <p:nvSpPr>
-          <p:cNvPr id="106" name="CustomShape 15"/>
-          <p:cNvSpPr/>
-          <p:nvPr/>
-        </p:nvSpPr>
-        <p:spPr>
-          <a:xfrm>
-            <a:off x="8265600" y="4739040"/>
-            <a:ext cx="1989360" cy="577440"/>
-          </a:xfrm>
-          <a:prstGeom prst="roundRect">
-            <a:avLst>
-              <a:gd name="adj" fmla="val 10000"/>
-            </a:avLst>
-          </a:prstGeom>
-          <a:solidFill>
-            <a:schemeClr val="accent5"/>
-          </a:solidFill>
-          <a:ln>
-            <a:solidFill>
-              <a:schemeClr val="lt1">
-                <a:hueOff val="0"/>
-                <a:satOff val="0"/>
-                <a:lumOff val="0"/>
-                <a:alphaOff val="0"/>
-              </a:schemeClr>
-            </a:solidFill>
-            <a:round/>
-          </a:ln>
-        </p:spPr>
-        <p:style>
-          <a:lnRef idx="2">
-            <a:scrgbClr r="0" g="0" b="0"/>
-          </a:lnRef>
-          <a:fillRef idx="0">
-            <a:scrgbClr r="0" g="0" b="0"/>
-          </a:fillRef>
-          <a:effectRef idx="0">
-            <a:scrgbClr r="0" g="0" b="0"/>
-          </a:effectRef>
-          <a:fontRef idx="minor"/>
-        </p:style>
-        <p:txBody>
-          <a:bodyPr lIns="58680" tIns="58680" rIns="41760" bIns="58680" anchor="ctr"/>
-          <a:lstStyle/>
-          <a:p>
-            <a:pPr algn="ctr">
+          <a:p>
+            <a:pPr marL="283320" indent="-282960">
               <a:lnSpc>
-                <a:spcPct val="90000"/>
+                <a:spcPct val="112000"/>
               </a:lnSpc>
+              <a:buClr>
+                <a:srgbClr val="262626"/>
+              </a:buClr>
+              <a:buFont typeface="Arial"/>
+              <a:buChar char="•"/>
             </a:pPr>
             <a:r>
-              <a:rPr lang="en-US" sz="1100" b="0" strike="noStrike" spc="-1">
-                <a:solidFill>
-                  <a:srgbClr val="FFFFFF"/>
+              <a:rPr lang="en-US" sz="2000" b="0" strike="noStrike" spc="-1">
+                <a:solidFill>
+                  <a:srgbClr val="262626"/>
                 </a:solidFill>
                 <a:uFill>
                   <a:solidFill>
@@ -7720,143 +7027,24 @@
                 </a:uFill>
                 <a:latin typeface="Corbel"/>
               </a:rPr>
-              <a:t>Team Objective</a:t>
+              <a:t>The configuration of the map and each region will be generated each match</a:t>
             </a:r>
-            <a:endParaRPr lang="en-US" sz="1800" b="0" strike="noStrike" spc="-1">
-              <a:solidFill>
-                <a:srgbClr val="000000"/>
-              </a:solidFill>
-              <a:uFill>
-                <a:solidFill>
-                  <a:srgbClr val="FFFFFF"/>
-                </a:solidFill>
-              </a:uFill>
-              <a:latin typeface="Arial"/>
-            </a:endParaRPr>
-          </a:p>
-        </p:txBody>
-      </p:sp>
-      <p:sp>
-        <p:nvSpPr>
-          <p:cNvPr id="107" name="CustomShape 16"/>
-          <p:cNvSpPr/>
-          <p:nvPr/>
-        </p:nvSpPr>
-        <p:spPr>
-          <a:xfrm>
-            <a:off x="9180720" y="2848680"/>
-            <a:ext cx="1126080" cy="230760"/>
-          </a:xfrm>
-          <a:custGeom>
-            <a:avLst/>
-            <a:gdLst/>
-            <a:ahLst/>
-            <a:cxnLst/>
-            <a:rect l="l" t="t" r="r" b="b"/>
-            <a:pathLst>
-              <a:path w="1126420" h="231060">
-                <a:moveTo>
-                  <a:pt x="0" y="0"/>
-                </a:moveTo>
-                <a:lnTo>
-                  <a:pt x="0" y="115530"/>
-                </a:lnTo>
-                <a:lnTo>
-                  <a:pt x="1126420" y="115530"/>
-                </a:lnTo>
-                <a:lnTo>
-                  <a:pt x="1126420" y="231060"/>
-                </a:lnTo>
-              </a:path>
-            </a:pathLst>
-          </a:custGeom>
-          <a:noFill/>
-          <a:ln>
-            <a:solidFill>
-              <a:schemeClr val="accent3">
-                <a:hueOff val="0"/>
-                <a:satOff val="0"/>
-                <a:lumOff val="0"/>
-                <a:alphaOff val="0"/>
-              </a:schemeClr>
-            </a:solidFill>
-            <a:round/>
-          </a:ln>
-        </p:spPr>
-        <p:style>
-          <a:lnRef idx="2">
-            <a:scrgbClr r="0" g="0" b="0"/>
-          </a:lnRef>
-          <a:fillRef idx="0">
-            <a:scrgbClr r="0" g="0" b="0"/>
-          </a:fillRef>
-          <a:effectRef idx="0">
-            <a:scrgbClr r="0" g="0" b="0"/>
-          </a:effectRef>
-          <a:fontRef idx="minor"/>
-        </p:style>
-      </p:sp>
-      <p:sp>
-        <p:nvSpPr>
-          <p:cNvPr id="108" name="CustomShape 17"/>
-          <p:cNvSpPr/>
-          <p:nvPr/>
-        </p:nvSpPr>
-        <p:spPr>
-          <a:xfrm>
-            <a:off x="9873720" y="3079800"/>
-            <a:ext cx="866160" cy="577440"/>
-          </a:xfrm>
-          <a:prstGeom prst="roundRect">
-            <a:avLst>
-              <a:gd name="adj" fmla="val 10000"/>
-            </a:avLst>
-          </a:prstGeom>
-          <a:solidFill>
-            <a:schemeClr val="accent3">
-              <a:hueOff val="0"/>
-              <a:satOff val="0"/>
-              <a:lumOff val="0"/>
-              <a:alphaOff val="0"/>
-            </a:schemeClr>
-          </a:solidFill>
-          <a:ln>
-            <a:solidFill>
-              <a:schemeClr val="lt1">
-                <a:hueOff val="0"/>
-                <a:satOff val="0"/>
-                <a:lumOff val="0"/>
-                <a:alphaOff val="0"/>
-              </a:schemeClr>
-            </a:solidFill>
-            <a:round/>
-          </a:ln>
-        </p:spPr>
-        <p:style>
-          <a:lnRef idx="2">
-            <a:scrgbClr r="0" g="0" b="0"/>
-          </a:lnRef>
-          <a:fillRef idx="0">
-            <a:scrgbClr r="0" g="0" b="0"/>
-          </a:fillRef>
-          <a:effectRef idx="0">
-            <a:scrgbClr r="0" g="0" b="0"/>
-          </a:effectRef>
-          <a:fontRef idx="minor"/>
-        </p:style>
-        <p:txBody>
-          <a:bodyPr lIns="58680" tIns="58680" rIns="41760" bIns="58680" anchor="ctr"/>
-          <a:lstStyle/>
-          <a:p>
-            <a:pPr algn="ctr">
+          </a:p>
+          <a:p>
+            <a:pPr marL="283320" indent="-282960">
               <a:lnSpc>
-                <a:spcPct val="90000"/>
+                <a:spcPct val="112000"/>
               </a:lnSpc>
+              <a:buClr>
+                <a:srgbClr val="262626"/>
+              </a:buClr>
+              <a:buFont typeface="Arial"/>
+              <a:buChar char="•"/>
             </a:pPr>
             <a:r>
-              <a:rPr lang="en-US" sz="1100" b="0" strike="noStrike" spc="-1">
-                <a:solidFill>
-                  <a:srgbClr val="FFFFFF"/>
+              <a:rPr lang="en-US" sz="2000" b="0" strike="noStrike" spc="-1">
+                <a:solidFill>
+                  <a:srgbClr val="262626"/>
                 </a:solidFill>
                 <a:uFill>
                   <a:solidFill>
@@ -7865,143 +7053,24 @@
                 </a:uFill>
                 <a:latin typeface="Corbel"/>
               </a:rPr>
-              <a:t>Components</a:t>
+              <a:t>Resources and enemies will be region specific</a:t>
             </a:r>
-            <a:endParaRPr lang="en-US" sz="1800" b="0" strike="noStrike" spc="-1">
-              <a:solidFill>
-                <a:srgbClr val="000000"/>
-              </a:solidFill>
-              <a:uFill>
-                <a:solidFill>
-                  <a:srgbClr val="FFFFFF"/>
-                </a:solidFill>
-              </a:uFill>
-              <a:latin typeface="Arial"/>
-            </a:endParaRPr>
-          </a:p>
-        </p:txBody>
-      </p:sp>
-      <p:sp>
-        <p:nvSpPr>
-          <p:cNvPr id="109" name="CustomShape 18"/>
-          <p:cNvSpPr/>
-          <p:nvPr/>
-        </p:nvSpPr>
-        <p:spPr>
-          <a:xfrm>
-            <a:off x="9743760" y="3657600"/>
-            <a:ext cx="562680" cy="230760"/>
-          </a:xfrm>
-          <a:custGeom>
-            <a:avLst/>
-            <a:gdLst/>
-            <a:ahLst/>
-            <a:cxnLst/>
-            <a:rect l="l" t="t" r="r" b="b"/>
-            <a:pathLst>
-              <a:path w="563210" h="231060">
-                <a:moveTo>
-                  <a:pt x="563210" y="0"/>
-                </a:moveTo>
-                <a:lnTo>
-                  <a:pt x="563210" y="115530"/>
-                </a:lnTo>
-                <a:lnTo>
-                  <a:pt x="0" y="115530"/>
-                </a:lnTo>
-                <a:lnTo>
-                  <a:pt x="0" y="231060"/>
-                </a:lnTo>
-              </a:path>
-            </a:pathLst>
-          </a:custGeom>
-          <a:noFill/>
-          <a:ln>
-            <a:solidFill>
-              <a:schemeClr val="accent4">
-                <a:hueOff val="0"/>
-                <a:satOff val="0"/>
-                <a:lumOff val="0"/>
-                <a:alphaOff val="0"/>
-              </a:schemeClr>
-            </a:solidFill>
-            <a:round/>
-          </a:ln>
-        </p:spPr>
-        <p:style>
-          <a:lnRef idx="2">
-            <a:scrgbClr r="0" g="0" b="0"/>
-          </a:lnRef>
-          <a:fillRef idx="0">
-            <a:scrgbClr r="0" g="0" b="0"/>
-          </a:fillRef>
-          <a:effectRef idx="0">
-            <a:scrgbClr r="0" g="0" b="0"/>
-          </a:effectRef>
-          <a:fontRef idx="minor"/>
-        </p:style>
-      </p:sp>
-      <p:sp>
-        <p:nvSpPr>
-          <p:cNvPr id="110" name="CustomShape 19"/>
-          <p:cNvSpPr/>
-          <p:nvPr/>
-        </p:nvSpPr>
-        <p:spPr>
-          <a:xfrm>
-            <a:off x="9310680" y="3888720"/>
-            <a:ext cx="866160" cy="577440"/>
-          </a:xfrm>
-          <a:prstGeom prst="roundRect">
-            <a:avLst>
-              <a:gd name="adj" fmla="val 10000"/>
-            </a:avLst>
-          </a:prstGeom>
-          <a:solidFill>
-            <a:schemeClr val="accent4">
-              <a:hueOff val="0"/>
-              <a:satOff val="0"/>
-              <a:lumOff val="0"/>
-              <a:alphaOff val="0"/>
-            </a:schemeClr>
-          </a:solidFill>
-          <a:ln>
-            <a:solidFill>
-              <a:schemeClr val="lt1">
-                <a:hueOff val="0"/>
-                <a:satOff val="0"/>
-                <a:lumOff val="0"/>
-                <a:alphaOff val="0"/>
-              </a:schemeClr>
-            </a:solidFill>
-            <a:round/>
-          </a:ln>
-        </p:spPr>
-        <p:style>
-          <a:lnRef idx="2">
-            <a:scrgbClr r="0" g="0" b="0"/>
-          </a:lnRef>
-          <a:fillRef idx="0">
-            <a:scrgbClr r="0" g="0" b="0"/>
-          </a:fillRef>
-          <a:effectRef idx="0">
-            <a:scrgbClr r="0" g="0" b="0"/>
-          </a:effectRef>
-          <a:fontRef idx="minor"/>
-        </p:style>
-        <p:txBody>
-          <a:bodyPr lIns="58680" tIns="58680" rIns="41760" bIns="58680" anchor="ctr"/>
-          <a:lstStyle/>
-          <a:p>
-            <a:pPr algn="ctr">
+          </a:p>
+          <a:p>
+            <a:pPr marL="685800" lvl="1" indent="-282960">
               <a:lnSpc>
-                <a:spcPct val="90000"/>
+                <a:spcPct val="100000"/>
               </a:lnSpc>
+              <a:buClr>
+                <a:srgbClr val="262626"/>
+              </a:buClr>
+              <a:buFont typeface="Corbel"/>
+              <a:buChar char="–"/>
             </a:pPr>
             <a:r>
-              <a:rPr lang="en-US" sz="1100" b="0" strike="noStrike" spc="-1">
-                <a:solidFill>
-                  <a:srgbClr val="FFFFFF"/>
+              <a:rPr lang="en-US" sz="1800" b="0" strike="noStrike" spc="-1">
+                <a:solidFill>
+                  <a:srgbClr val="262626"/>
                 </a:solidFill>
                 <a:uFill>
                   <a:solidFill>
@@ -8010,294 +7079,45 @@
                 </a:uFill>
                 <a:latin typeface="Corbel"/>
               </a:rPr>
-              <a:t>Resources</a:t>
+              <a:t>Excluding generic (common) resources that might appear in multiple regions at varying percentages (wood, rocks, etc.)</a:t>
             </a:r>
-            <a:endParaRPr lang="en-US" sz="1800" b="0" strike="noStrike" spc="-1">
+            <a:endParaRPr lang="en-US" sz="1600" b="0" strike="noStrike" spc="-1">
               <a:solidFill>
-                <a:srgbClr val="000000"/>
+                <a:srgbClr val="262626"/>
               </a:solidFill>
               <a:uFill>
                 <a:solidFill>
                   <a:srgbClr val="FFFFFF"/>
                 </a:solidFill>
               </a:uFill>
-              <a:latin typeface="Arial"/>
+              <a:latin typeface="Corbel"/>
             </a:endParaRPr>
           </a:p>
         </p:txBody>
       </p:sp>
-      <p:sp>
-        <p:nvSpPr>
-          <p:cNvPr id="111" name="CustomShape 20"/>
-          <p:cNvSpPr/>
+      <p:pic>
+        <p:nvPicPr>
+          <p:cNvPr id="119" name="Picture 4"/>
+          <p:cNvPicPr/>
           <p:nvPr/>
-        </p:nvSpPr>
-        <p:spPr>
-          <a:xfrm>
-            <a:off x="10307160" y="3657600"/>
-            <a:ext cx="562680" cy="230760"/>
-          </a:xfrm>
-          <a:custGeom>
-            <a:avLst/>
-            <a:gdLst/>
-            <a:ahLst/>
-            <a:cxnLst/>
-            <a:rect l="l" t="t" r="r" b="b"/>
-            <a:pathLst>
-              <a:path w="563210" h="231060">
-                <a:moveTo>
-                  <a:pt x="0" y="0"/>
-                </a:moveTo>
-                <a:lnTo>
-                  <a:pt x="0" y="115530"/>
-                </a:lnTo>
-                <a:lnTo>
-                  <a:pt x="563210" y="115530"/>
-                </a:lnTo>
-                <a:lnTo>
-                  <a:pt x="563210" y="231060"/>
-                </a:lnTo>
-              </a:path>
-            </a:pathLst>
-          </a:custGeom>
-          <a:noFill/>
-          <a:ln>
-            <a:solidFill>
-              <a:schemeClr val="accent4">
-                <a:hueOff val="0"/>
-                <a:satOff val="0"/>
-                <a:lumOff val="0"/>
-                <a:alphaOff val="0"/>
-              </a:schemeClr>
-            </a:solidFill>
-            <a:round/>
-          </a:ln>
-        </p:spPr>
-        <p:style>
-          <a:lnRef idx="2">
-            <a:scrgbClr r="0" g="0" b="0"/>
-          </a:lnRef>
-          <a:fillRef idx="0">
-            <a:scrgbClr r="0" g="0" b="0"/>
-          </a:fillRef>
-          <a:effectRef idx="0">
-            <a:scrgbClr r="0" g="0" b="0"/>
-          </a:effectRef>
-          <a:fontRef idx="minor"/>
-        </p:style>
-      </p:sp>
-      <p:sp>
-        <p:nvSpPr>
-          <p:cNvPr id="112" name="CustomShape 21"/>
-          <p:cNvSpPr/>
-          <p:nvPr/>
-        </p:nvSpPr>
-        <p:spPr>
-          <a:xfrm>
-            <a:off x="10437120" y="3888720"/>
-            <a:ext cx="866160" cy="577440"/>
-          </a:xfrm>
-          <a:prstGeom prst="roundRect">
-            <a:avLst>
-              <a:gd name="adj" fmla="val 10000"/>
-            </a:avLst>
-          </a:prstGeom>
-          <a:solidFill>
-            <a:schemeClr val="accent4">
-              <a:hueOff val="0"/>
-              <a:satOff val="0"/>
-              <a:lumOff val="0"/>
-              <a:alphaOff val="0"/>
-            </a:schemeClr>
-          </a:solidFill>
-          <a:ln>
-            <a:solidFill>
-              <a:schemeClr val="lt1">
-                <a:hueOff val="0"/>
-                <a:satOff val="0"/>
-                <a:lumOff val="0"/>
-                <a:alphaOff val="0"/>
-              </a:schemeClr>
-            </a:solidFill>
-            <a:round/>
-          </a:ln>
-        </p:spPr>
-        <p:style>
-          <a:lnRef idx="2">
-            <a:scrgbClr r="0" g="0" b="0"/>
-          </a:lnRef>
-          <a:fillRef idx="0">
-            <a:scrgbClr r="0" g="0" b="0"/>
-          </a:fillRef>
-          <a:effectRef idx="0">
-            <a:scrgbClr r="0" g="0" b="0"/>
-          </a:effectRef>
-          <a:fontRef idx="minor"/>
-        </p:style>
-        <p:txBody>
-          <a:bodyPr lIns="58680" tIns="58680" rIns="41760" bIns="58680" anchor="ctr"/>
-          <a:lstStyle/>
-          <a:p>
-            <a:pPr algn="ctr">
-              <a:lnSpc>
-                <a:spcPct val="90000"/>
-              </a:lnSpc>
-            </a:pPr>
-            <a:r>
-              <a:rPr lang="en-US" sz="1100" b="0" strike="noStrike" spc="-1">
-                <a:solidFill>
-                  <a:srgbClr val="FFFFFF"/>
-                </a:solidFill>
-                <a:uFill>
-                  <a:solidFill>
-                    <a:srgbClr val="FFFFFF"/>
-                  </a:solidFill>
-                </a:uFill>
-                <a:latin typeface="Corbel"/>
-              </a:rPr>
-              <a:t>Enemy Composition</a:t>
-            </a:r>
-            <a:endParaRPr lang="en-US" sz="1800" b="0" strike="noStrike" spc="-1">
-              <a:solidFill>
-                <a:srgbClr val="000000"/>
-              </a:solidFill>
-              <a:uFill>
-                <a:solidFill>
-                  <a:srgbClr val="FFFFFF"/>
-                </a:solidFill>
-              </a:uFill>
-              <a:latin typeface="Arial"/>
-            </a:endParaRPr>
-          </a:p>
-        </p:txBody>
-      </p:sp>
-      <p:sp>
-        <p:nvSpPr>
-          <p:cNvPr id="113" name="Line 22"/>
-          <p:cNvSpPr/>
-          <p:nvPr/>
-        </p:nvSpPr>
-        <p:spPr>
-          <a:xfrm>
-            <a:off x="7462440" y="4498200"/>
-            <a:ext cx="360" cy="122040"/>
-          </a:xfrm>
-          <a:prstGeom prst="line">
+        </p:nvPicPr>
+        <p:blipFill>
+          <a:blip r:embed="rId2"/>
+          <a:stretch/>
+        </p:blipFill>
+        <p:spPr>
+          <a:xfrm>
+            <a:off x="8820970" y="981081"/>
+            <a:ext cx="2297520" cy="1893240"/>
+          </a:xfrm>
+          <a:prstGeom prst="rect">
             <a:avLst/>
           </a:prstGeom>
           <a:ln>
-            <a:round/>
+            <a:noFill/>
           </a:ln>
         </p:spPr>
-        <p:style>
-          <a:lnRef idx="1">
-            <a:schemeClr val="accent1"/>
-          </a:lnRef>
-          <a:fillRef idx="0">
-            <a:schemeClr val="accent1"/>
-          </a:fillRef>
-          <a:effectRef idx="0">
-            <a:schemeClr val="accent1"/>
-          </a:effectRef>
-          <a:fontRef idx="minor"/>
-        </p:style>
-      </p:sp>
-      <p:sp>
-        <p:nvSpPr>
-          <p:cNvPr id="114" name="Line 23"/>
-          <p:cNvSpPr/>
-          <p:nvPr/>
-        </p:nvSpPr>
-        <p:spPr>
-          <a:xfrm flipH="1" flipV="1">
-            <a:off x="7459920" y="4620240"/>
-            <a:ext cx="3472200" cy="2520"/>
-          </a:xfrm>
-          <a:prstGeom prst="line">
-            <a:avLst/>
-          </a:prstGeom>
-          <a:ln w="19080">
-            <a:solidFill>
-              <a:schemeClr val="accent4"/>
-            </a:solidFill>
-            <a:round/>
-          </a:ln>
-        </p:spPr>
-        <p:style>
-          <a:lnRef idx="1">
-            <a:schemeClr val="accent1"/>
-          </a:lnRef>
-          <a:fillRef idx="0">
-            <a:schemeClr val="accent1"/>
-          </a:fillRef>
-          <a:effectRef idx="0">
-            <a:schemeClr val="accent1"/>
-          </a:effectRef>
-          <a:fontRef idx="minor"/>
-        </p:style>
-      </p:sp>
-      <p:sp>
-        <p:nvSpPr>
-          <p:cNvPr id="115" name="Line 24"/>
-          <p:cNvSpPr/>
-          <p:nvPr/>
-        </p:nvSpPr>
-        <p:spPr>
-          <a:xfrm>
-            <a:off x="10932120" y="4498200"/>
-            <a:ext cx="360" cy="122040"/>
-          </a:xfrm>
-          <a:prstGeom prst="line">
-            <a:avLst/>
-          </a:prstGeom>
-          <a:ln>
-            <a:round/>
-          </a:ln>
-        </p:spPr>
-        <p:style>
-          <a:lnRef idx="1">
-            <a:schemeClr val="accent1"/>
-          </a:lnRef>
-          <a:fillRef idx="0">
-            <a:schemeClr val="accent1"/>
-          </a:fillRef>
-          <a:effectRef idx="0">
-            <a:schemeClr val="accent1"/>
-          </a:effectRef>
-          <a:fontRef idx="minor"/>
-        </p:style>
-      </p:sp>
-      <p:sp>
-        <p:nvSpPr>
-          <p:cNvPr id="116" name="Line 25"/>
-          <p:cNvSpPr/>
-          <p:nvPr/>
-        </p:nvSpPr>
-        <p:spPr>
-          <a:xfrm>
-            <a:off x="9727920" y="4498200"/>
-            <a:ext cx="360" cy="119520"/>
-          </a:xfrm>
-          <a:prstGeom prst="line">
-            <a:avLst/>
-          </a:prstGeom>
-          <a:ln>
-            <a:round/>
-          </a:ln>
-        </p:spPr>
-        <p:style>
-          <a:lnRef idx="1">
-            <a:schemeClr val="accent1"/>
-          </a:lnRef>
-          <a:fillRef idx="0">
-            <a:schemeClr val="accent1"/>
-          </a:fillRef>
-          <a:effectRef idx="0">
-            <a:schemeClr val="accent1"/>
-          </a:effectRef>
-          <a:fontRef idx="minor"/>
-        </p:style>
-      </p:sp>
+      </p:pic>
     </p:spTree>
   </p:cSld>
   <p:clrMapOvr>
@@ -8352,7 +7172,7 @@
       </p:grpSpPr>
       <p:sp>
         <p:nvSpPr>
-          <p:cNvPr id="117" name="TextShape 1"/>
+          <p:cNvPr id="92" name="TextShape 1"/>
           <p:cNvSpPr txBox="1"/>
           <p:nvPr/>
         </p:nvSpPr>
@@ -8390,7 +7210,7 @@
                 </a:uFill>
                 <a:latin typeface="Century Schoolbook"/>
               </a:rPr>
-              <a:t>Level Design</a:t>
+              <a:t>Decision Tree</a:t>
             </a:r>
             <a:endParaRPr lang="en-US" sz="1800" b="0" strike="noStrike" spc="-1">
               <a:solidFill>
@@ -8408,41 +7228,58 @@
       </p:sp>
       <p:sp>
         <p:nvSpPr>
-          <p:cNvPr id="118" name="TextShape 2"/>
-          <p:cNvSpPr txBox="1"/>
+          <p:cNvPr id="93" name="CustomShape 2"/>
+          <p:cNvSpPr/>
           <p:nvPr/>
         </p:nvSpPr>
         <p:spPr>
           <a:xfrm>
-            <a:off x="5181480" y="569160"/>
-            <a:ext cx="6248160" cy="5654880"/>
-          </a:xfrm>
-          <a:prstGeom prst="rect">
-            <a:avLst/>
+            <a:off x="5181480" y="4695120"/>
+            <a:ext cx="6248160" cy="693000"/>
+          </a:xfrm>
+          <a:prstGeom prst="roundRect">
+            <a:avLst>
+              <a:gd name="adj" fmla="val 10000"/>
+            </a:avLst>
           </a:prstGeom>
-          <a:noFill/>
+          <a:solidFill>
+            <a:schemeClr val="accent2">
+              <a:tint val="40000"/>
+              <a:hueOff val="0"/>
+              <a:satOff val="0"/>
+              <a:lumOff val="0"/>
+              <a:alphaOff val="0"/>
+            </a:schemeClr>
+          </a:solidFill>
           <a:ln>
             <a:noFill/>
           </a:ln>
         </p:spPr>
+        <p:style>
+          <a:lnRef idx="0">
+            <a:scrgbClr r="0" g="0" b="0"/>
+          </a:lnRef>
+          <a:fillRef idx="0">
+            <a:scrgbClr r="0" g="0" b="0"/>
+          </a:fillRef>
+          <a:effectRef idx="0">
+            <a:scrgbClr r="0" g="0" b="0"/>
+          </a:effectRef>
+          <a:fontRef idx="minor"/>
+        </p:style>
         <p:txBody>
-          <a:bodyPr/>
+          <a:bodyPr lIns="170640" tIns="170640" rIns="170640" bIns="170640" anchor="ctr"/>
           <a:lstStyle/>
           <a:p>
-            <a:pPr marL="283320" indent="-282960">
+            <a:pPr>
               <a:lnSpc>
-                <a:spcPct val="112000"/>
+                <a:spcPct val="90000"/>
               </a:lnSpc>
-              <a:buClr>
-                <a:srgbClr val="262626"/>
-              </a:buClr>
-              <a:buFont typeface="Arial"/>
-              <a:buChar char="•"/>
             </a:pPr>
             <a:r>
-              <a:rPr lang="en-US" sz="2000" b="0" strike="noStrike" spc="-1">
-                <a:solidFill>
-                  <a:srgbClr val="262626"/>
+              <a:rPr lang="en-US" sz="2400" b="0" strike="noStrike" spc="-1">
+                <a:solidFill>
+                  <a:srgbClr val="000000"/>
                 </a:solidFill>
                 <a:uFill>
                   <a:solidFill>
@@ -8451,24 +7288,76 @@
                 </a:uFill>
                 <a:latin typeface="Corbel"/>
               </a:rPr>
-              <a:t>Four regions (one for each corner) randomly selected:</a:t>
+              <a:t>Late Game</a:t>
             </a:r>
-          </a:p>
-          <a:p>
-            <a:pPr marL="685800" lvl="1" indent="-282960">
+            <a:endParaRPr lang="en-US" sz="1800" b="0" strike="noStrike" spc="-1">
+              <a:solidFill>
+                <a:srgbClr val="000000"/>
+              </a:solidFill>
+              <a:uFill>
+                <a:solidFill>
+                  <a:srgbClr val="FFFFFF"/>
+                </a:solidFill>
+              </a:uFill>
+              <a:latin typeface="Arial"/>
+            </a:endParaRPr>
+          </a:p>
+        </p:txBody>
+      </p:sp>
+      <p:sp>
+        <p:nvSpPr>
+          <p:cNvPr id="94" name="CustomShape 3"/>
+          <p:cNvSpPr/>
+          <p:nvPr/>
+        </p:nvSpPr>
+        <p:spPr>
+          <a:xfrm>
+            <a:off x="5181480" y="3022560"/>
+            <a:ext cx="6248160" cy="1556640"/>
+          </a:xfrm>
+          <a:prstGeom prst="roundRect">
+            <a:avLst>
+              <a:gd name="adj" fmla="val 10000"/>
+            </a:avLst>
+          </a:prstGeom>
+          <a:solidFill>
+            <a:schemeClr val="accent2">
+              <a:tint val="40000"/>
+              <a:hueOff val="0"/>
+              <a:satOff val="0"/>
+              <a:lumOff val="0"/>
+              <a:alphaOff val="0"/>
+            </a:schemeClr>
+          </a:solidFill>
+          <a:ln>
+            <a:noFill/>
+          </a:ln>
+        </p:spPr>
+        <p:style>
+          <a:lnRef idx="0">
+            <a:scrgbClr r="0" g="0" b="0"/>
+          </a:lnRef>
+          <a:fillRef idx="0">
+            <a:scrgbClr r="0" g="0" b="0"/>
+          </a:fillRef>
+          <a:effectRef idx="0">
+            <a:scrgbClr r="0" g="0" b="0"/>
+          </a:effectRef>
+          <a:fontRef idx="minor"/>
+        </p:style>
+        <p:txBody>
+          <a:bodyPr lIns="170640" tIns="170640" rIns="170640" bIns="170640" anchor="ctr"/>
+          <a:lstStyle/>
+          <a:p>
+            <a:pPr>
               <a:lnSpc>
-                <a:spcPct val="100000"/>
+                <a:spcPct val="90000"/>
               </a:lnSpc>
-              <a:buClr>
-                <a:srgbClr val="262626"/>
-              </a:buClr>
-              <a:buFont typeface="Corbel"/>
-              <a:buChar char="–"/>
             </a:pPr>
             <a:r>
-              <a:rPr lang="en-US" sz="1800" b="0" strike="noStrike" spc="-1">
-                <a:solidFill>
-                  <a:srgbClr val="262626"/>
+              <a:rPr lang="en-US" sz="2400" b="0" strike="noStrike" spc="-1" dirty="0">
+                <a:solidFill>
+                  <a:srgbClr val="000000"/>
                 </a:solidFill>
                 <a:uFill>
                   <a:solidFill>
@@ -8477,35 +7366,76 @@
                 </a:uFill>
                 <a:latin typeface="Corbel"/>
               </a:rPr>
-              <a:t>Mountains</a:t>
+              <a:t>Early Game</a:t>
             </a:r>
-            <a:endParaRPr lang="en-US" sz="1600" b="0" strike="noStrike" spc="-1">
+            <a:endParaRPr lang="en-US" sz="1800" b="0" strike="noStrike" spc="-1" dirty="0">
               <a:solidFill>
-                <a:srgbClr val="262626"/>
+                <a:srgbClr val="000000"/>
               </a:solidFill>
               <a:uFill>
                 <a:solidFill>
                   <a:srgbClr val="FFFFFF"/>
                 </a:solidFill>
               </a:uFill>
-              <a:latin typeface="Corbel"/>
+              <a:latin typeface="Arial"/>
             </a:endParaRPr>
           </a:p>
-          <a:p>
-            <a:pPr marL="685800" lvl="1" indent="-282960">
+        </p:txBody>
+      </p:sp>
+      <p:sp>
+        <p:nvSpPr>
+          <p:cNvPr id="95" name="CustomShape 4"/>
+          <p:cNvSpPr/>
+          <p:nvPr/>
+        </p:nvSpPr>
+        <p:spPr>
+          <a:xfrm>
+            <a:off x="5181480" y="1404720"/>
+            <a:ext cx="6248160" cy="1501920"/>
+          </a:xfrm>
+          <a:prstGeom prst="roundRect">
+            <a:avLst>
+              <a:gd name="adj" fmla="val 10000"/>
+            </a:avLst>
+          </a:prstGeom>
+          <a:solidFill>
+            <a:schemeClr val="accent2">
+              <a:tint val="40000"/>
+              <a:hueOff val="0"/>
+              <a:satOff val="0"/>
+              <a:lumOff val="0"/>
+              <a:alphaOff val="0"/>
+            </a:schemeClr>
+          </a:solidFill>
+          <a:ln>
+            <a:noFill/>
+          </a:ln>
+        </p:spPr>
+        <p:style>
+          <a:lnRef idx="0">
+            <a:scrgbClr r="0" g="0" b="0"/>
+          </a:lnRef>
+          <a:fillRef idx="0">
+            <a:scrgbClr r="0" g="0" b="0"/>
+          </a:fillRef>
+          <a:effectRef idx="0">
+            <a:scrgbClr r="0" g="0" b="0"/>
+          </a:effectRef>
+          <a:fontRef idx="minor"/>
+        </p:style>
+        <p:txBody>
+          <a:bodyPr lIns="170640" tIns="170640" rIns="170640" bIns="170640" anchor="ctr"/>
+          <a:lstStyle/>
+          <a:p>
+            <a:pPr>
               <a:lnSpc>
-                <a:spcPct val="100000"/>
+                <a:spcPct val="90000"/>
               </a:lnSpc>
-              <a:buClr>
-                <a:srgbClr val="262626"/>
-              </a:buClr>
-              <a:buFont typeface="Corbel"/>
-              <a:buChar char="–"/>
             </a:pPr>
             <a:r>
-              <a:rPr lang="en-US" sz="1800" b="0" strike="noStrike" spc="-1">
-                <a:solidFill>
-                  <a:srgbClr val="262626"/>
+              <a:rPr lang="en-US" sz="2400" b="0" strike="noStrike" spc="-1">
+                <a:solidFill>
+                  <a:srgbClr val="000000"/>
                 </a:solidFill>
                 <a:uFill>
                   <a:solidFill>
@@ -8514,35 +7444,83 @@
                 </a:uFill>
                 <a:latin typeface="Corbel"/>
               </a:rPr>
-              <a:t>Forest</a:t>
+              <a:t>Pre-Game</a:t>
             </a:r>
-            <a:endParaRPr lang="en-US" sz="1600" b="0" strike="noStrike" spc="-1">
+            <a:endParaRPr lang="en-US" sz="1800" b="0" strike="noStrike" spc="-1">
               <a:solidFill>
-                <a:srgbClr val="262626"/>
+                <a:srgbClr val="000000"/>
               </a:solidFill>
               <a:uFill>
                 <a:solidFill>
                   <a:srgbClr val="FFFFFF"/>
                 </a:solidFill>
               </a:uFill>
-              <a:latin typeface="Corbel"/>
+              <a:latin typeface="Arial"/>
             </a:endParaRPr>
           </a:p>
-          <a:p>
-            <a:pPr marL="685800" lvl="1" indent="-282960">
+        </p:txBody>
+      </p:sp>
+      <p:sp>
+        <p:nvSpPr>
+          <p:cNvPr id="96" name="CustomShape 5"/>
+          <p:cNvSpPr/>
+          <p:nvPr/>
+        </p:nvSpPr>
+        <p:spPr>
+          <a:xfrm>
+            <a:off x="8747280" y="1462320"/>
+            <a:ext cx="980640" cy="577440"/>
+          </a:xfrm>
+          <a:prstGeom prst="roundRect">
+            <a:avLst>
+              <a:gd name="adj" fmla="val 10000"/>
+            </a:avLst>
+          </a:prstGeom>
+          <a:solidFill>
+            <a:schemeClr val="accent1">
+              <a:hueOff val="0"/>
+              <a:satOff val="0"/>
+              <a:lumOff val="0"/>
+              <a:alphaOff val="0"/>
+            </a:schemeClr>
+          </a:solidFill>
+          <a:ln>
+            <a:solidFill>
+              <a:schemeClr val="lt1">
+                <a:hueOff val="0"/>
+                <a:satOff val="0"/>
+                <a:lumOff val="0"/>
+                <a:alphaOff val="0"/>
+              </a:schemeClr>
+            </a:solidFill>
+            <a:round/>
+          </a:ln>
+        </p:spPr>
+        <p:style>
+          <a:lnRef idx="2">
+            <a:scrgbClr r="0" g="0" b="0"/>
+          </a:lnRef>
+          <a:fillRef idx="0">
+            <a:scrgbClr r="0" g="0" b="0"/>
+          </a:fillRef>
+          <a:effectRef idx="0">
+            <a:scrgbClr r="0" g="0" b="0"/>
+          </a:effectRef>
+          <a:fontRef idx="minor"/>
+        </p:style>
+        <p:txBody>
+          <a:bodyPr lIns="58680" tIns="58680" rIns="41760" bIns="58680" anchor="ctr"/>
+          <a:lstStyle/>
+          <a:p>
+            <a:pPr algn="ctr">
               <a:lnSpc>
-                <a:spcPct val="100000"/>
+                <a:spcPct val="90000"/>
               </a:lnSpc>
-              <a:buClr>
-                <a:srgbClr val="262626"/>
-              </a:buClr>
-              <a:buFont typeface="Corbel"/>
-              <a:buChar char="–"/>
             </a:pPr>
             <a:r>
-              <a:rPr lang="en-US" sz="1800" b="0" strike="noStrike" spc="-1">
-                <a:solidFill>
-                  <a:srgbClr val="262626"/>
+              <a:rPr lang="en-US" sz="1100" b="0" strike="noStrike" spc="-1">
+                <a:solidFill>
+                  <a:srgbClr val="FFFFFF"/>
                 </a:solidFill>
                 <a:uFill>
                   <a:solidFill>
@@ -8551,35 +7529,137 @@
                 </a:uFill>
                 <a:latin typeface="Corbel"/>
               </a:rPr>
-              <a:t>Desert</a:t>
+              <a:t>Team Composition</a:t>
             </a:r>
-            <a:endParaRPr lang="en-US" sz="1600" b="0" strike="noStrike" spc="-1">
+            <a:endParaRPr lang="en-US" sz="1800" b="0" strike="noStrike" spc="-1">
               <a:solidFill>
-                <a:srgbClr val="262626"/>
+                <a:srgbClr val="000000"/>
               </a:solidFill>
               <a:uFill>
                 <a:solidFill>
                   <a:srgbClr val="FFFFFF"/>
                 </a:solidFill>
               </a:uFill>
-              <a:latin typeface="Corbel"/>
+              <a:latin typeface="Arial"/>
             </a:endParaRPr>
           </a:p>
-          <a:p>
-            <a:pPr marL="685800" lvl="1" indent="-282960">
+        </p:txBody>
+      </p:sp>
+      <p:sp>
+        <p:nvSpPr>
+          <p:cNvPr id="97" name="CustomShape 6"/>
+          <p:cNvSpPr/>
+          <p:nvPr/>
+        </p:nvSpPr>
+        <p:spPr>
+          <a:xfrm>
+            <a:off x="9135000" y="2040120"/>
+            <a:ext cx="91080" cy="230760"/>
+          </a:xfrm>
+          <a:custGeom>
+            <a:avLst/>
+            <a:gdLst/>
+            <a:ahLst/>
+            <a:cxnLst/>
+            <a:rect l="l" t="t" r="r" b="b"/>
+            <a:pathLst>
+              <a:path h="231060">
+                <a:moveTo>
+                  <a:pt x="45720" y="0"/>
+                </a:moveTo>
+                <a:lnTo>
+                  <a:pt x="45720" y="231060"/>
+                </a:lnTo>
+              </a:path>
+            </a:pathLst>
+          </a:custGeom>
+          <a:noFill/>
+          <a:ln>
+            <a:solidFill>
+              <a:schemeClr val="accent2">
+                <a:hueOff val="0"/>
+                <a:satOff val="0"/>
+                <a:lumOff val="0"/>
+                <a:alphaOff val="0"/>
+              </a:schemeClr>
+            </a:solidFill>
+            <a:round/>
+          </a:ln>
+        </p:spPr>
+        <p:style>
+          <a:lnRef idx="2">
+            <a:scrgbClr r="0" g="0" b="0"/>
+          </a:lnRef>
+          <a:fillRef idx="0">
+            <a:scrgbClr r="0" g="0" b="0"/>
+          </a:fillRef>
+          <a:effectRef idx="0">
+            <a:scrgbClr r="0" g="0" b="0"/>
+          </a:effectRef>
+          <a:fontRef idx="minor"/>
+        </p:style>
+      </p:sp>
+      <p:sp>
+        <p:nvSpPr>
+          <p:cNvPr id="98" name="CustomShape 7"/>
+          <p:cNvSpPr/>
+          <p:nvPr/>
+        </p:nvSpPr>
+        <p:spPr>
+          <a:xfrm>
+            <a:off x="8747280" y="2271240"/>
+            <a:ext cx="866160" cy="577440"/>
+          </a:xfrm>
+          <a:prstGeom prst="roundRect">
+            <a:avLst>
+              <a:gd name="adj" fmla="val 10000"/>
+            </a:avLst>
+          </a:prstGeom>
+          <a:solidFill>
+            <a:schemeClr val="accent2">
+              <a:hueOff val="0"/>
+              <a:satOff val="0"/>
+              <a:lumOff val="0"/>
+              <a:alphaOff val="0"/>
+            </a:schemeClr>
+          </a:solidFill>
+          <a:ln>
+            <a:solidFill>
+              <a:schemeClr val="lt1">
+                <a:hueOff val="0"/>
+                <a:satOff val="0"/>
+                <a:lumOff val="0"/>
+                <a:alphaOff val="0"/>
+              </a:schemeClr>
+            </a:solidFill>
+            <a:round/>
+          </a:ln>
+        </p:spPr>
+        <p:style>
+          <a:lnRef idx="2">
+            <a:scrgbClr r="0" g="0" b="0"/>
+          </a:lnRef>
+          <a:fillRef idx="0">
+            <a:scrgbClr r="0" g="0" b="0"/>
+          </a:fillRef>
+          <a:effectRef idx="0">
+            <a:scrgbClr r="0" g="0" b="0"/>
+          </a:effectRef>
+          <a:fontRef idx="minor"/>
+        </p:style>
+        <p:txBody>
+          <a:bodyPr lIns="58680" tIns="58680" rIns="41760" bIns="58680" anchor="ctr"/>
+          <a:lstStyle/>
+          <a:p>
+            <a:pPr algn="ctr">
               <a:lnSpc>
-                <a:spcPct val="100000"/>
+                <a:spcPct val="90000"/>
               </a:lnSpc>
-              <a:buClr>
-                <a:srgbClr val="262626"/>
-              </a:buClr>
-              <a:buFont typeface="Corbel"/>
-              <a:buChar char="–"/>
             </a:pPr>
             <a:r>
-              <a:rPr lang="en-US" sz="1800" b="0" strike="noStrike" spc="-1">
-                <a:solidFill>
-                  <a:srgbClr val="262626"/>
+              <a:rPr lang="en-US" sz="1100" b="0" strike="noStrike" spc="-1">
+                <a:solidFill>
+                  <a:srgbClr val="FFFFFF"/>
                 </a:solidFill>
                 <a:uFill>
                   <a:solidFill>
@@ -8588,35 +7668,143 @@
                 </a:uFill>
                 <a:latin typeface="Corbel"/>
               </a:rPr>
-              <a:t>Swamp</a:t>
+              <a:t>Character Selection</a:t>
             </a:r>
-            <a:endParaRPr lang="en-US" sz="1600" b="0" strike="noStrike" spc="-1">
+            <a:endParaRPr lang="en-US" sz="1800" b="0" strike="noStrike" spc="-1">
               <a:solidFill>
-                <a:srgbClr val="262626"/>
+                <a:srgbClr val="000000"/>
               </a:solidFill>
               <a:uFill>
                 <a:solidFill>
                   <a:srgbClr val="FFFFFF"/>
                 </a:solidFill>
               </a:uFill>
-              <a:latin typeface="Corbel"/>
+              <a:latin typeface="Arial"/>
             </a:endParaRPr>
           </a:p>
-          <a:p>
-            <a:pPr marL="685800" lvl="1" indent="-282960">
+        </p:txBody>
+      </p:sp>
+      <p:sp>
+        <p:nvSpPr>
+          <p:cNvPr id="99" name="CustomShape 8"/>
+          <p:cNvSpPr/>
+          <p:nvPr/>
+        </p:nvSpPr>
+        <p:spPr>
+          <a:xfrm>
+            <a:off x="8054280" y="2848680"/>
+            <a:ext cx="1126080" cy="230760"/>
+          </a:xfrm>
+          <a:custGeom>
+            <a:avLst/>
+            <a:gdLst/>
+            <a:ahLst/>
+            <a:cxnLst/>
+            <a:rect l="l" t="t" r="r" b="b"/>
+            <a:pathLst>
+              <a:path w="1126420" h="231060">
+                <a:moveTo>
+                  <a:pt x="1126420" y="0"/>
+                </a:moveTo>
+                <a:lnTo>
+                  <a:pt x="1126420" y="115530"/>
+                </a:lnTo>
+                <a:lnTo>
+                  <a:pt x="0" y="115530"/>
+                </a:lnTo>
+                <a:lnTo>
+                  <a:pt x="0" y="231060"/>
+                </a:lnTo>
+              </a:path>
+            </a:pathLst>
+          </a:custGeom>
+          <a:noFill/>
+          <a:ln>
+            <a:solidFill>
+              <a:schemeClr val="accent3">
+                <a:hueOff val="0"/>
+                <a:satOff val="0"/>
+                <a:lumOff val="0"/>
+                <a:alphaOff val="0"/>
+              </a:schemeClr>
+            </a:solidFill>
+            <a:round/>
+          </a:ln>
+        </p:spPr>
+        <p:style>
+          <a:lnRef idx="2">
+            <a:scrgbClr r="0" g="0" b="0"/>
+          </a:lnRef>
+          <a:fillRef idx="0">
+            <a:scrgbClr r="0" g="0" b="0"/>
+          </a:fillRef>
+          <a:effectRef idx="0">
+            <a:scrgbClr r="0" g="0" b="0"/>
+          </a:effectRef>
+          <a:fontRef idx="minor"/>
+        </p:style>
+      </p:sp>
+      <p:sp>
+        <p:nvSpPr>
+          <p:cNvPr id="100" name="CustomShape 9"/>
+          <p:cNvSpPr/>
+          <p:nvPr/>
+        </p:nvSpPr>
+        <p:spPr>
+          <a:xfrm>
+            <a:off x="7620840" y="3079800"/>
+            <a:ext cx="866160" cy="577440"/>
+          </a:xfrm>
+          <a:prstGeom prst="roundRect">
+            <a:avLst>
+              <a:gd name="adj" fmla="val 10000"/>
+            </a:avLst>
+          </a:prstGeom>
+          <a:solidFill>
+            <a:schemeClr val="accent3">
+              <a:hueOff val="0"/>
+              <a:satOff val="0"/>
+              <a:lumOff val="0"/>
+              <a:alphaOff val="0"/>
+            </a:schemeClr>
+          </a:solidFill>
+          <a:ln>
+            <a:solidFill>
+              <a:schemeClr val="lt1">
+                <a:hueOff val="0"/>
+                <a:satOff val="0"/>
+                <a:lumOff val="0"/>
+                <a:alphaOff val="0"/>
+              </a:schemeClr>
+            </a:solidFill>
+            <a:round/>
+          </a:ln>
+        </p:spPr>
+        <p:style>
+          <a:lnRef idx="2">
+            <a:scrgbClr r="0" g="0" b="0"/>
+          </a:lnRef>
+          <a:fillRef idx="0">
+            <a:scrgbClr r="0" g="0" b="0"/>
+          </a:fillRef>
+          <a:effectRef idx="0">
+            <a:scrgbClr r="0" g="0" b="0"/>
+          </a:effectRef>
+          <a:fontRef idx="minor"/>
+        </p:style>
+        <p:txBody>
+          <a:bodyPr lIns="58680" tIns="58680" rIns="41760" bIns="58680" anchor="ctr"/>
+          <a:lstStyle/>
+          <a:p>
+            <a:pPr algn="ctr">
               <a:lnSpc>
-                <a:spcPct val="100000"/>
+                <a:spcPct val="90000"/>
               </a:lnSpc>
-              <a:buClr>
-                <a:srgbClr val="262626"/>
-              </a:buClr>
-              <a:buFont typeface="Corbel"/>
-              <a:buChar char="–"/>
             </a:pPr>
             <a:r>
-              <a:rPr lang="en-US" sz="1800" b="0" strike="noStrike" spc="-1">
-                <a:solidFill>
-                  <a:srgbClr val="262626"/>
+              <a:rPr lang="en-US" sz="1100" b="0" strike="noStrike" spc="-1">
+                <a:solidFill>
+                  <a:srgbClr val="FFFFFF"/>
                 </a:solidFill>
                 <a:uFill>
                   <a:solidFill>
@@ -8625,35 +7813,143 @@
                 </a:uFill>
                 <a:latin typeface="Corbel"/>
               </a:rPr>
-              <a:t>Coast</a:t>
+              <a:t>Abilities</a:t>
             </a:r>
-            <a:endParaRPr lang="en-US" sz="1600" b="0" strike="noStrike" spc="-1">
+            <a:endParaRPr lang="en-US" sz="1800" b="0" strike="noStrike" spc="-1">
               <a:solidFill>
-                <a:srgbClr val="262626"/>
+                <a:srgbClr val="000000"/>
               </a:solidFill>
               <a:uFill>
                 <a:solidFill>
                   <a:srgbClr val="FFFFFF"/>
                 </a:solidFill>
               </a:uFill>
-              <a:latin typeface="Corbel"/>
+              <a:latin typeface="Arial"/>
             </a:endParaRPr>
           </a:p>
-          <a:p>
-            <a:pPr marL="283320" indent="-282960">
+        </p:txBody>
+      </p:sp>
+      <p:sp>
+        <p:nvSpPr>
+          <p:cNvPr id="101" name="CustomShape 10"/>
+          <p:cNvSpPr/>
+          <p:nvPr/>
+        </p:nvSpPr>
+        <p:spPr>
+          <a:xfrm>
+            <a:off x="7490880" y="3657600"/>
+            <a:ext cx="562680" cy="230760"/>
+          </a:xfrm>
+          <a:custGeom>
+            <a:avLst/>
+            <a:gdLst/>
+            <a:ahLst/>
+            <a:cxnLst/>
+            <a:rect l="l" t="t" r="r" b="b"/>
+            <a:pathLst>
+              <a:path w="563210" h="231060">
+                <a:moveTo>
+                  <a:pt x="563210" y="0"/>
+                </a:moveTo>
+                <a:lnTo>
+                  <a:pt x="563210" y="115530"/>
+                </a:lnTo>
+                <a:lnTo>
+                  <a:pt x="0" y="115530"/>
+                </a:lnTo>
+                <a:lnTo>
+                  <a:pt x="0" y="231060"/>
+                </a:lnTo>
+              </a:path>
+            </a:pathLst>
+          </a:custGeom>
+          <a:noFill/>
+          <a:ln>
+            <a:solidFill>
+              <a:schemeClr val="accent4">
+                <a:hueOff val="0"/>
+                <a:satOff val="0"/>
+                <a:lumOff val="0"/>
+                <a:alphaOff val="0"/>
+              </a:schemeClr>
+            </a:solidFill>
+            <a:round/>
+          </a:ln>
+        </p:spPr>
+        <p:style>
+          <a:lnRef idx="2">
+            <a:scrgbClr r="0" g="0" b="0"/>
+          </a:lnRef>
+          <a:fillRef idx="0">
+            <a:scrgbClr r="0" g="0" b="0"/>
+          </a:fillRef>
+          <a:effectRef idx="0">
+            <a:scrgbClr r="0" g="0" b="0"/>
+          </a:effectRef>
+          <a:fontRef idx="minor"/>
+        </p:style>
+      </p:sp>
+      <p:sp>
+        <p:nvSpPr>
+          <p:cNvPr id="102" name="CustomShape 11"/>
+          <p:cNvSpPr/>
+          <p:nvPr/>
+        </p:nvSpPr>
+        <p:spPr>
+          <a:xfrm>
+            <a:off x="7057800" y="3888720"/>
+            <a:ext cx="866160" cy="577440"/>
+          </a:xfrm>
+          <a:prstGeom prst="roundRect">
+            <a:avLst>
+              <a:gd name="adj" fmla="val 10000"/>
+            </a:avLst>
+          </a:prstGeom>
+          <a:solidFill>
+            <a:schemeClr val="accent4">
+              <a:hueOff val="0"/>
+              <a:satOff val="0"/>
+              <a:lumOff val="0"/>
+              <a:alphaOff val="0"/>
+            </a:schemeClr>
+          </a:solidFill>
+          <a:ln>
+            <a:solidFill>
+              <a:schemeClr val="lt1">
+                <a:hueOff val="0"/>
+                <a:satOff val="0"/>
+                <a:lumOff val="0"/>
+                <a:alphaOff val="0"/>
+              </a:schemeClr>
+            </a:solidFill>
+            <a:round/>
+          </a:ln>
+        </p:spPr>
+        <p:style>
+          <a:lnRef idx="2">
+            <a:scrgbClr r="0" g="0" b="0"/>
+          </a:lnRef>
+          <a:fillRef idx="0">
+            <a:scrgbClr r="0" g="0" b="0"/>
+          </a:fillRef>
+          <a:effectRef idx="0">
+            <a:scrgbClr r="0" g="0" b="0"/>
+          </a:effectRef>
+          <a:fontRef idx="minor"/>
+        </p:style>
+        <p:txBody>
+          <a:bodyPr lIns="58680" tIns="58680" rIns="41760" bIns="58680" anchor="ctr"/>
+          <a:lstStyle/>
+          <a:p>
+            <a:pPr algn="ctr">
               <a:lnSpc>
-                <a:spcPct val="112000"/>
+                <a:spcPct val="90000"/>
               </a:lnSpc>
-              <a:buClr>
-                <a:srgbClr val="262626"/>
-              </a:buClr>
-              <a:buFont typeface="Arial"/>
-              <a:buChar char="•"/>
             </a:pPr>
             <a:r>
-              <a:rPr lang="en-US" sz="2000" b="0" strike="noStrike" spc="-1">
-                <a:solidFill>
-                  <a:srgbClr val="262626"/>
+              <a:rPr lang="en-US" sz="1100" b="0" strike="noStrike" spc="-1">
+                <a:solidFill>
+                  <a:srgbClr val="FFFFFF"/>
                 </a:solidFill>
                 <a:uFill>
                   <a:solidFill>
@@ -8662,24 +7958,143 @@
                 </a:uFill>
                 <a:latin typeface="Corbel"/>
               </a:rPr>
-              <a:t>The center is open grassland</a:t>
+              <a:t>Personal Goal</a:t>
             </a:r>
-          </a:p>
-          <a:p>
-            <a:pPr marL="685800" lvl="1" indent="-282960">
+            <a:endParaRPr lang="en-US" sz="1800" b="0" strike="noStrike" spc="-1">
+              <a:solidFill>
+                <a:srgbClr val="000000"/>
+              </a:solidFill>
+              <a:uFill>
+                <a:solidFill>
+                  <a:srgbClr val="FFFFFF"/>
+                </a:solidFill>
+              </a:uFill>
+              <a:latin typeface="Arial"/>
+            </a:endParaRPr>
+          </a:p>
+        </p:txBody>
+      </p:sp>
+      <p:sp>
+        <p:nvSpPr>
+          <p:cNvPr id="103" name="CustomShape 12"/>
+          <p:cNvSpPr/>
+          <p:nvPr/>
+        </p:nvSpPr>
+        <p:spPr>
+          <a:xfrm>
+            <a:off x="8054280" y="3657600"/>
+            <a:ext cx="562680" cy="230760"/>
+          </a:xfrm>
+          <a:custGeom>
+            <a:avLst/>
+            <a:gdLst/>
+            <a:ahLst/>
+            <a:cxnLst/>
+            <a:rect l="l" t="t" r="r" b="b"/>
+            <a:pathLst>
+              <a:path w="563210" h="231060">
+                <a:moveTo>
+                  <a:pt x="0" y="0"/>
+                </a:moveTo>
+                <a:lnTo>
+                  <a:pt x="0" y="115530"/>
+                </a:lnTo>
+                <a:lnTo>
+                  <a:pt x="563210" y="115530"/>
+                </a:lnTo>
+                <a:lnTo>
+                  <a:pt x="563210" y="231060"/>
+                </a:lnTo>
+              </a:path>
+            </a:pathLst>
+          </a:custGeom>
+          <a:noFill/>
+          <a:ln>
+            <a:solidFill>
+              <a:schemeClr val="accent4">
+                <a:hueOff val="0"/>
+                <a:satOff val="0"/>
+                <a:lumOff val="0"/>
+                <a:alphaOff val="0"/>
+              </a:schemeClr>
+            </a:solidFill>
+            <a:round/>
+          </a:ln>
+        </p:spPr>
+        <p:style>
+          <a:lnRef idx="2">
+            <a:scrgbClr r="0" g="0" b="0"/>
+          </a:lnRef>
+          <a:fillRef idx="0">
+            <a:scrgbClr r="0" g="0" b="0"/>
+          </a:fillRef>
+          <a:effectRef idx="0">
+            <a:scrgbClr r="0" g="0" b="0"/>
+          </a:effectRef>
+          <a:fontRef idx="minor"/>
+        </p:style>
+      </p:sp>
+      <p:sp>
+        <p:nvSpPr>
+          <p:cNvPr id="104" name="CustomShape 13"/>
+          <p:cNvSpPr/>
+          <p:nvPr/>
+        </p:nvSpPr>
+        <p:spPr>
+          <a:xfrm>
+            <a:off x="8184240" y="3888720"/>
+            <a:ext cx="866160" cy="577440"/>
+          </a:xfrm>
+          <a:prstGeom prst="roundRect">
+            <a:avLst>
+              <a:gd name="adj" fmla="val 10000"/>
+            </a:avLst>
+          </a:prstGeom>
+          <a:solidFill>
+            <a:schemeClr val="accent4">
+              <a:hueOff val="0"/>
+              <a:satOff val="0"/>
+              <a:lumOff val="0"/>
+              <a:alphaOff val="0"/>
+            </a:schemeClr>
+          </a:solidFill>
+          <a:ln>
+            <a:solidFill>
+              <a:schemeClr val="lt1">
+                <a:hueOff val="0"/>
+                <a:satOff val="0"/>
+                <a:lumOff val="0"/>
+                <a:alphaOff val="0"/>
+              </a:schemeClr>
+            </a:solidFill>
+            <a:round/>
+          </a:ln>
+        </p:spPr>
+        <p:style>
+          <a:lnRef idx="2">
+            <a:scrgbClr r="0" g="0" b="0"/>
+          </a:lnRef>
+          <a:fillRef idx="0">
+            <a:scrgbClr r="0" g="0" b="0"/>
+          </a:fillRef>
+          <a:effectRef idx="0">
+            <a:scrgbClr r="0" g="0" b="0"/>
+          </a:effectRef>
+          <a:fontRef idx="minor"/>
+        </p:style>
+        <p:txBody>
+          <a:bodyPr lIns="58680" tIns="58680" rIns="41760" bIns="58680" anchor="ctr"/>
+          <a:lstStyle/>
+          <a:p>
+            <a:pPr algn="ctr">
               <a:lnSpc>
-                <a:spcPct val="100000"/>
+                <a:spcPct val="90000"/>
               </a:lnSpc>
-              <a:buClr>
-                <a:srgbClr val="262626"/>
-              </a:buClr>
-              <a:buFont typeface="Corbel"/>
-              <a:buChar char="–"/>
             </a:pPr>
             <a:r>
-              <a:rPr lang="en-US" sz="1800" b="0" strike="noStrike" spc="-1">
-                <a:solidFill>
-                  <a:srgbClr val="262626"/>
+              <a:rPr lang="en-US" sz="1100" b="0" strike="noStrike" spc="-1">
+                <a:solidFill>
+                  <a:srgbClr val="FFFFFF"/>
                 </a:solidFill>
                 <a:uFill>
                   <a:solidFill>
@@ -8688,35 +8103,138 @@
                 </a:uFill>
                 <a:latin typeface="Corbel"/>
               </a:rPr>
-              <a:t>“No man’s land”</a:t>
+              <a:t>Regions</a:t>
             </a:r>
-            <a:endParaRPr lang="en-US" sz="1600" b="0" strike="noStrike" spc="-1">
+            <a:endParaRPr lang="en-US" sz="1800" b="0" strike="noStrike" spc="-1">
               <a:solidFill>
-                <a:srgbClr val="262626"/>
+                <a:srgbClr val="000000"/>
               </a:solidFill>
               <a:uFill>
                 <a:solidFill>
                   <a:srgbClr val="FFFFFF"/>
                 </a:solidFill>
               </a:uFill>
-              <a:latin typeface="Corbel"/>
+              <a:latin typeface="Arial"/>
             </a:endParaRPr>
           </a:p>
-          <a:p>
-            <a:pPr marL="283320" indent="-282960">
+        </p:txBody>
+      </p:sp>
+      <p:sp>
+        <p:nvSpPr>
+          <p:cNvPr id="105" name="CustomShape 14"/>
+          <p:cNvSpPr/>
+          <p:nvPr/>
+        </p:nvSpPr>
+        <p:spPr>
+          <a:xfrm>
+            <a:off x="8617320" y="4466160"/>
+            <a:ext cx="642600" cy="272520"/>
+          </a:xfrm>
+          <a:custGeom>
+            <a:avLst/>
+            <a:gdLst/>
+            <a:ahLst/>
+            <a:cxnLst/>
+            <a:rect l="l" t="t" r="r" b="b"/>
+            <a:pathLst>
+              <a:path w="642856" h="272940">
+                <a:moveTo>
+                  <a:pt x="0" y="0"/>
+                </a:moveTo>
+                <a:lnTo>
+                  <a:pt x="0" y="136470"/>
+                </a:lnTo>
+                <a:lnTo>
+                  <a:pt x="642856" y="136470"/>
+                </a:lnTo>
+                <a:lnTo>
+                  <a:pt x="642856" y="272940"/>
+                </a:lnTo>
+              </a:path>
+            </a:pathLst>
+          </a:custGeom>
+          <a:noFill/>
+          <a:ln>
+            <a:solidFill>
+              <a:schemeClr val="accent4">
+                <a:hueOff val="0"/>
+                <a:satOff val="0"/>
+                <a:lumOff val="0"/>
+                <a:alphaOff val="0"/>
+              </a:schemeClr>
+            </a:solidFill>
+            <a:round/>
+          </a:ln>
+        </p:spPr>
+        <p:style>
+          <a:lnRef idx="2">
+            <a:scrgbClr r="0" g="0" b="0"/>
+          </a:lnRef>
+          <a:fillRef idx="0">
+            <a:scrgbClr r="0" g="0" b="0"/>
+          </a:fillRef>
+          <a:effectRef idx="0">
+            <a:scrgbClr r="0" g="0" b="0"/>
+          </a:effectRef>
+          <a:fontRef idx="minor"/>
+        </p:style>
+      </p:sp>
+      <p:sp>
+        <p:nvSpPr>
+          <p:cNvPr id="106" name="CustomShape 15"/>
+          <p:cNvSpPr/>
+          <p:nvPr/>
+        </p:nvSpPr>
+        <p:spPr>
+          <a:xfrm>
+            <a:off x="8265600" y="4739040"/>
+            <a:ext cx="1989360" cy="577440"/>
+          </a:xfrm>
+          <a:prstGeom prst="roundRect">
+            <a:avLst>
+              <a:gd name="adj" fmla="val 10000"/>
+            </a:avLst>
+          </a:prstGeom>
+          <a:solidFill>
+            <a:schemeClr val="accent5"/>
+          </a:solidFill>
+          <a:ln>
+            <a:solidFill>
+              <a:schemeClr val="lt1">
+                <a:hueOff val="0"/>
+                <a:satOff val="0"/>
+                <a:lumOff val="0"/>
+                <a:alphaOff val="0"/>
+              </a:schemeClr>
+            </a:solidFill>
+            <a:round/>
+          </a:ln>
+        </p:spPr>
+        <p:style>
+          <a:lnRef idx="2">
+            <a:scrgbClr r="0" g="0" b="0"/>
+          </a:lnRef>
+          <a:fillRef idx="0">
+            <a:scrgbClr r="0" g="0" b="0"/>
+          </a:fillRef>
+          <a:effectRef idx="0">
+            <a:scrgbClr r="0" g="0" b="0"/>
+          </a:effectRef>
+          <a:fontRef idx="minor"/>
+        </p:style>
+        <p:txBody>
+          <a:bodyPr lIns="58680" tIns="58680" rIns="41760" bIns="58680" anchor="ctr"/>
+          <a:lstStyle/>
+          <a:p>
+            <a:pPr algn="ctr">
               <a:lnSpc>
-                <a:spcPct val="112000"/>
+                <a:spcPct val="90000"/>
               </a:lnSpc>
-              <a:buClr>
-                <a:srgbClr val="262626"/>
-              </a:buClr>
-              <a:buFont typeface="Arial"/>
-              <a:buChar char="•"/>
             </a:pPr>
             <a:r>
-              <a:rPr lang="en-US" sz="2000" b="0" strike="noStrike" spc="-1">
-                <a:solidFill>
-                  <a:srgbClr val="262626"/>
+              <a:rPr lang="en-US" sz="1100" b="0" strike="noStrike" spc="-1">
+                <a:solidFill>
+                  <a:srgbClr val="FFFFFF"/>
                 </a:solidFill>
                 <a:uFill>
                   <a:solidFill>
@@ -8725,24 +8243,143 @@
                 </a:uFill>
                 <a:latin typeface="Corbel"/>
               </a:rPr>
-              <a:t>The configuration of the map and each region will be generated each match</a:t>
+              <a:t>Team Objective</a:t>
             </a:r>
-          </a:p>
-          <a:p>
-            <a:pPr marL="283320" indent="-282960">
+            <a:endParaRPr lang="en-US" sz="1800" b="0" strike="noStrike" spc="-1">
+              <a:solidFill>
+                <a:srgbClr val="000000"/>
+              </a:solidFill>
+              <a:uFill>
+                <a:solidFill>
+                  <a:srgbClr val="FFFFFF"/>
+                </a:solidFill>
+              </a:uFill>
+              <a:latin typeface="Arial"/>
+            </a:endParaRPr>
+          </a:p>
+        </p:txBody>
+      </p:sp>
+      <p:sp>
+        <p:nvSpPr>
+          <p:cNvPr id="107" name="CustomShape 16"/>
+          <p:cNvSpPr/>
+          <p:nvPr/>
+        </p:nvSpPr>
+        <p:spPr>
+          <a:xfrm>
+            <a:off x="9180720" y="2848680"/>
+            <a:ext cx="1126080" cy="230760"/>
+          </a:xfrm>
+          <a:custGeom>
+            <a:avLst/>
+            <a:gdLst/>
+            <a:ahLst/>
+            <a:cxnLst/>
+            <a:rect l="l" t="t" r="r" b="b"/>
+            <a:pathLst>
+              <a:path w="1126420" h="231060">
+                <a:moveTo>
+                  <a:pt x="0" y="0"/>
+                </a:moveTo>
+                <a:lnTo>
+                  <a:pt x="0" y="115530"/>
+                </a:lnTo>
+                <a:lnTo>
+                  <a:pt x="1126420" y="115530"/>
+                </a:lnTo>
+                <a:lnTo>
+                  <a:pt x="1126420" y="231060"/>
+                </a:lnTo>
+              </a:path>
+            </a:pathLst>
+          </a:custGeom>
+          <a:noFill/>
+          <a:ln>
+            <a:solidFill>
+              <a:schemeClr val="accent3">
+                <a:hueOff val="0"/>
+                <a:satOff val="0"/>
+                <a:lumOff val="0"/>
+                <a:alphaOff val="0"/>
+              </a:schemeClr>
+            </a:solidFill>
+            <a:round/>
+          </a:ln>
+        </p:spPr>
+        <p:style>
+          <a:lnRef idx="2">
+            <a:scrgbClr r="0" g="0" b="0"/>
+          </a:lnRef>
+          <a:fillRef idx="0">
+            <a:scrgbClr r="0" g="0" b="0"/>
+          </a:fillRef>
+          <a:effectRef idx="0">
+            <a:scrgbClr r="0" g="0" b="0"/>
+          </a:effectRef>
+          <a:fontRef idx="minor"/>
+        </p:style>
+      </p:sp>
+      <p:sp>
+        <p:nvSpPr>
+          <p:cNvPr id="108" name="CustomShape 17"/>
+          <p:cNvSpPr/>
+          <p:nvPr/>
+        </p:nvSpPr>
+        <p:spPr>
+          <a:xfrm>
+            <a:off x="9873720" y="3079800"/>
+            <a:ext cx="996120" cy="577440"/>
+          </a:xfrm>
+          <a:prstGeom prst="roundRect">
+            <a:avLst>
+              <a:gd name="adj" fmla="val 10000"/>
+            </a:avLst>
+          </a:prstGeom>
+          <a:solidFill>
+            <a:schemeClr val="accent3">
+              <a:hueOff val="0"/>
+              <a:satOff val="0"/>
+              <a:lumOff val="0"/>
+              <a:alphaOff val="0"/>
+            </a:schemeClr>
+          </a:solidFill>
+          <a:ln>
+            <a:solidFill>
+              <a:schemeClr val="lt1">
+                <a:hueOff val="0"/>
+                <a:satOff val="0"/>
+                <a:lumOff val="0"/>
+                <a:alphaOff val="0"/>
+              </a:schemeClr>
+            </a:solidFill>
+            <a:round/>
+          </a:ln>
+        </p:spPr>
+        <p:style>
+          <a:lnRef idx="2">
+            <a:scrgbClr r="0" g="0" b="0"/>
+          </a:lnRef>
+          <a:fillRef idx="0">
+            <a:scrgbClr r="0" g="0" b="0"/>
+          </a:fillRef>
+          <a:effectRef idx="0">
+            <a:scrgbClr r="0" g="0" b="0"/>
+          </a:effectRef>
+          <a:fontRef idx="minor"/>
+        </p:style>
+        <p:txBody>
+          <a:bodyPr lIns="58680" tIns="58680" rIns="41760" bIns="58680" anchor="ctr"/>
+          <a:lstStyle/>
+          <a:p>
+            <a:pPr algn="ctr">
               <a:lnSpc>
-                <a:spcPct val="112000"/>
+                <a:spcPct val="90000"/>
               </a:lnSpc>
-              <a:buClr>
-                <a:srgbClr val="262626"/>
-              </a:buClr>
-              <a:buFont typeface="Arial"/>
-              <a:buChar char="•"/>
             </a:pPr>
             <a:r>
-              <a:rPr lang="en-US" sz="2000" b="0" strike="noStrike" spc="-1">
-                <a:solidFill>
-                  <a:srgbClr val="262626"/>
+              <a:rPr lang="en-US" sz="1100" b="0" strike="noStrike" spc="-1" dirty="0">
+                <a:solidFill>
+                  <a:srgbClr val="FFFFFF"/>
                 </a:solidFill>
                 <a:uFill>
                   <a:solidFill>
@@ -8751,24 +8388,143 @@
                 </a:uFill>
                 <a:latin typeface="Corbel"/>
               </a:rPr>
-              <a:t>Resources and enemies will be region specific</a:t>
+              <a:t>Components</a:t>
             </a:r>
-          </a:p>
-          <a:p>
-            <a:pPr marL="685800" lvl="1" indent="-282960">
+            <a:endParaRPr lang="en-US" sz="1800" b="0" strike="noStrike" spc="-1" dirty="0">
+              <a:solidFill>
+                <a:srgbClr val="000000"/>
+              </a:solidFill>
+              <a:uFill>
+                <a:solidFill>
+                  <a:srgbClr val="FFFFFF"/>
+                </a:solidFill>
+              </a:uFill>
+              <a:latin typeface="Arial"/>
+            </a:endParaRPr>
+          </a:p>
+        </p:txBody>
+      </p:sp>
+      <p:sp>
+        <p:nvSpPr>
+          <p:cNvPr id="109" name="CustomShape 18"/>
+          <p:cNvSpPr/>
+          <p:nvPr/>
+        </p:nvSpPr>
+        <p:spPr>
+          <a:xfrm>
+            <a:off x="9743760" y="3657600"/>
+            <a:ext cx="562680" cy="230760"/>
+          </a:xfrm>
+          <a:custGeom>
+            <a:avLst/>
+            <a:gdLst/>
+            <a:ahLst/>
+            <a:cxnLst/>
+            <a:rect l="l" t="t" r="r" b="b"/>
+            <a:pathLst>
+              <a:path w="563210" h="231060">
+                <a:moveTo>
+                  <a:pt x="563210" y="0"/>
+                </a:moveTo>
+                <a:lnTo>
+                  <a:pt x="563210" y="115530"/>
+                </a:lnTo>
+                <a:lnTo>
+                  <a:pt x="0" y="115530"/>
+                </a:lnTo>
+                <a:lnTo>
+                  <a:pt x="0" y="231060"/>
+                </a:lnTo>
+              </a:path>
+            </a:pathLst>
+          </a:custGeom>
+          <a:noFill/>
+          <a:ln>
+            <a:solidFill>
+              <a:schemeClr val="accent4">
+                <a:hueOff val="0"/>
+                <a:satOff val="0"/>
+                <a:lumOff val="0"/>
+                <a:alphaOff val="0"/>
+              </a:schemeClr>
+            </a:solidFill>
+            <a:round/>
+          </a:ln>
+        </p:spPr>
+        <p:style>
+          <a:lnRef idx="2">
+            <a:scrgbClr r="0" g="0" b="0"/>
+          </a:lnRef>
+          <a:fillRef idx="0">
+            <a:scrgbClr r="0" g="0" b="0"/>
+          </a:fillRef>
+          <a:effectRef idx="0">
+            <a:scrgbClr r="0" g="0" b="0"/>
+          </a:effectRef>
+          <a:fontRef idx="minor"/>
+        </p:style>
+      </p:sp>
+      <p:sp>
+        <p:nvSpPr>
+          <p:cNvPr id="110" name="CustomShape 19"/>
+          <p:cNvSpPr/>
+          <p:nvPr/>
+        </p:nvSpPr>
+        <p:spPr>
+          <a:xfrm>
+            <a:off x="9310680" y="3888720"/>
+            <a:ext cx="866160" cy="577440"/>
+          </a:xfrm>
+          <a:prstGeom prst="roundRect">
+            <a:avLst>
+              <a:gd name="adj" fmla="val 10000"/>
+            </a:avLst>
+          </a:prstGeom>
+          <a:solidFill>
+            <a:schemeClr val="accent4">
+              <a:hueOff val="0"/>
+              <a:satOff val="0"/>
+              <a:lumOff val="0"/>
+              <a:alphaOff val="0"/>
+            </a:schemeClr>
+          </a:solidFill>
+          <a:ln>
+            <a:solidFill>
+              <a:schemeClr val="lt1">
+                <a:hueOff val="0"/>
+                <a:satOff val="0"/>
+                <a:lumOff val="0"/>
+                <a:alphaOff val="0"/>
+              </a:schemeClr>
+            </a:solidFill>
+            <a:round/>
+          </a:ln>
+        </p:spPr>
+        <p:style>
+          <a:lnRef idx="2">
+            <a:scrgbClr r="0" g="0" b="0"/>
+          </a:lnRef>
+          <a:fillRef idx="0">
+            <a:scrgbClr r="0" g="0" b="0"/>
+          </a:fillRef>
+          <a:effectRef idx="0">
+            <a:scrgbClr r="0" g="0" b="0"/>
+          </a:effectRef>
+          <a:fontRef idx="minor"/>
+        </p:style>
+        <p:txBody>
+          <a:bodyPr lIns="58680" tIns="58680" rIns="41760" bIns="58680" anchor="ctr"/>
+          <a:lstStyle/>
+          <a:p>
+            <a:pPr algn="ctr">
               <a:lnSpc>
-                <a:spcPct val="100000"/>
+                <a:spcPct val="90000"/>
               </a:lnSpc>
-              <a:buClr>
-                <a:srgbClr val="262626"/>
-              </a:buClr>
-              <a:buFont typeface="Corbel"/>
-              <a:buChar char="–"/>
             </a:pPr>
             <a:r>
-              <a:rPr lang="en-US" sz="1800" b="0" strike="noStrike" spc="-1">
-                <a:solidFill>
-                  <a:srgbClr val="262626"/>
+              <a:rPr lang="en-US" sz="1100" b="0" strike="noStrike" spc="-1">
+                <a:solidFill>
+                  <a:srgbClr val="FFFFFF"/>
                 </a:solidFill>
                 <a:uFill>
                   <a:solidFill>
@@ -8777,45 +8533,294 @@
                 </a:uFill>
                 <a:latin typeface="Corbel"/>
               </a:rPr>
-              <a:t>Excluding generic (common) resources that might appear in multiple regions at varying percentages (wood, rocks, etc.)</a:t>
+              <a:t>Resources</a:t>
             </a:r>
-            <a:endParaRPr lang="en-US" sz="1600" b="0" strike="noStrike" spc="-1">
+            <a:endParaRPr lang="en-US" sz="1800" b="0" strike="noStrike" spc="-1">
               <a:solidFill>
-                <a:srgbClr val="262626"/>
+                <a:srgbClr val="000000"/>
               </a:solidFill>
               <a:uFill>
                 <a:solidFill>
                   <a:srgbClr val="FFFFFF"/>
                 </a:solidFill>
               </a:uFill>
-              <a:latin typeface="Corbel"/>
+              <a:latin typeface="Arial"/>
             </a:endParaRPr>
           </a:p>
         </p:txBody>
       </p:sp>
-      <p:pic>
-        <p:nvPicPr>
-          <p:cNvPr id="119" name="Picture 4"/>
-          <p:cNvPicPr/>
+      <p:sp>
+        <p:nvSpPr>
+          <p:cNvPr id="111" name="CustomShape 20"/>
+          <p:cNvSpPr/>
           <p:nvPr/>
-        </p:nvPicPr>
-        <p:blipFill>
-          <a:blip r:embed="rId2"/>
-          <a:stretch/>
-        </p:blipFill>
-        <p:spPr>
-          <a:xfrm>
-            <a:off x="7300080" y="1121040"/>
-            <a:ext cx="2297520" cy="1893240"/>
-          </a:xfrm>
-          <a:prstGeom prst="rect">
+        </p:nvSpPr>
+        <p:spPr>
+          <a:xfrm>
+            <a:off x="10307160" y="3657600"/>
+            <a:ext cx="562680" cy="230760"/>
+          </a:xfrm>
+          <a:custGeom>
+            <a:avLst/>
+            <a:gdLst/>
+            <a:ahLst/>
+            <a:cxnLst/>
+            <a:rect l="l" t="t" r="r" b="b"/>
+            <a:pathLst>
+              <a:path w="563210" h="231060">
+                <a:moveTo>
+                  <a:pt x="0" y="0"/>
+                </a:moveTo>
+                <a:lnTo>
+                  <a:pt x="0" y="115530"/>
+                </a:lnTo>
+                <a:lnTo>
+                  <a:pt x="563210" y="115530"/>
+                </a:lnTo>
+                <a:lnTo>
+                  <a:pt x="563210" y="231060"/>
+                </a:lnTo>
+              </a:path>
+            </a:pathLst>
+          </a:custGeom>
+          <a:noFill/>
+          <a:ln>
+            <a:solidFill>
+              <a:schemeClr val="accent4">
+                <a:hueOff val="0"/>
+                <a:satOff val="0"/>
+                <a:lumOff val="0"/>
+                <a:alphaOff val="0"/>
+              </a:schemeClr>
+            </a:solidFill>
+            <a:round/>
+          </a:ln>
+        </p:spPr>
+        <p:style>
+          <a:lnRef idx="2">
+            <a:scrgbClr r="0" g="0" b="0"/>
+          </a:lnRef>
+          <a:fillRef idx="0">
+            <a:scrgbClr r="0" g="0" b="0"/>
+          </a:fillRef>
+          <a:effectRef idx="0">
+            <a:scrgbClr r="0" g="0" b="0"/>
+          </a:effectRef>
+          <a:fontRef idx="minor"/>
+        </p:style>
+      </p:sp>
+      <p:sp>
+        <p:nvSpPr>
+          <p:cNvPr id="112" name="CustomShape 21"/>
+          <p:cNvSpPr/>
+          <p:nvPr/>
+        </p:nvSpPr>
+        <p:spPr>
+          <a:xfrm>
+            <a:off x="10437120" y="3888720"/>
+            <a:ext cx="992520" cy="577440"/>
+          </a:xfrm>
+          <a:prstGeom prst="roundRect">
+            <a:avLst>
+              <a:gd name="adj" fmla="val 10000"/>
+            </a:avLst>
+          </a:prstGeom>
+          <a:solidFill>
+            <a:schemeClr val="accent4">
+              <a:hueOff val="0"/>
+              <a:satOff val="0"/>
+              <a:lumOff val="0"/>
+              <a:alphaOff val="0"/>
+            </a:schemeClr>
+          </a:solidFill>
+          <a:ln>
+            <a:solidFill>
+              <a:schemeClr val="lt1">
+                <a:hueOff val="0"/>
+                <a:satOff val="0"/>
+                <a:lumOff val="0"/>
+                <a:alphaOff val="0"/>
+              </a:schemeClr>
+            </a:solidFill>
+            <a:round/>
+          </a:ln>
+        </p:spPr>
+        <p:style>
+          <a:lnRef idx="2">
+            <a:scrgbClr r="0" g="0" b="0"/>
+          </a:lnRef>
+          <a:fillRef idx="0">
+            <a:scrgbClr r="0" g="0" b="0"/>
+          </a:fillRef>
+          <a:effectRef idx="0">
+            <a:scrgbClr r="0" g="0" b="0"/>
+          </a:effectRef>
+          <a:fontRef idx="minor"/>
+        </p:style>
+        <p:txBody>
+          <a:bodyPr lIns="58680" tIns="58680" rIns="41760" bIns="58680" anchor="ctr"/>
+          <a:lstStyle/>
+          <a:p>
+            <a:pPr algn="ctr">
+              <a:lnSpc>
+                <a:spcPct val="90000"/>
+              </a:lnSpc>
+            </a:pPr>
+            <a:r>
+              <a:rPr lang="en-US" sz="1100" b="0" strike="noStrike" spc="-1">
+                <a:solidFill>
+                  <a:srgbClr val="FFFFFF"/>
+                </a:solidFill>
+                <a:uFill>
+                  <a:solidFill>
+                    <a:srgbClr val="FFFFFF"/>
+                  </a:solidFill>
+                </a:uFill>
+                <a:latin typeface="Corbel"/>
+              </a:rPr>
+              <a:t>Enemy Composition</a:t>
+            </a:r>
+            <a:endParaRPr lang="en-US" sz="1800" b="0" strike="noStrike" spc="-1">
+              <a:solidFill>
+                <a:srgbClr val="000000"/>
+              </a:solidFill>
+              <a:uFill>
+                <a:solidFill>
+                  <a:srgbClr val="FFFFFF"/>
+                </a:solidFill>
+              </a:uFill>
+              <a:latin typeface="Arial"/>
+            </a:endParaRPr>
+          </a:p>
+        </p:txBody>
+      </p:sp>
+      <p:sp>
+        <p:nvSpPr>
+          <p:cNvPr id="113" name="Line 22"/>
+          <p:cNvSpPr/>
+          <p:nvPr/>
+        </p:nvSpPr>
+        <p:spPr>
+          <a:xfrm>
+            <a:off x="7462440" y="4498200"/>
+            <a:ext cx="360" cy="122040"/>
+          </a:xfrm>
+          <a:prstGeom prst="line">
             <a:avLst/>
           </a:prstGeom>
           <a:ln>
-            <a:noFill/>
+            <a:round/>
           </a:ln>
         </p:spPr>
-      </p:pic>
+        <p:style>
+          <a:lnRef idx="1">
+            <a:schemeClr val="accent1"/>
+          </a:lnRef>
+          <a:fillRef idx="0">
+            <a:schemeClr val="accent1"/>
+          </a:fillRef>
+          <a:effectRef idx="0">
+            <a:schemeClr val="accent1"/>
+          </a:effectRef>
+          <a:fontRef idx="minor"/>
+        </p:style>
+      </p:sp>
+      <p:sp>
+        <p:nvSpPr>
+          <p:cNvPr id="114" name="Line 23"/>
+          <p:cNvSpPr/>
+          <p:nvPr/>
+        </p:nvSpPr>
+        <p:spPr>
+          <a:xfrm flipH="1" flipV="1">
+            <a:off x="7459920" y="4620240"/>
+            <a:ext cx="3472200" cy="2520"/>
+          </a:xfrm>
+          <a:prstGeom prst="line">
+            <a:avLst/>
+          </a:prstGeom>
+          <a:ln w="19080">
+            <a:solidFill>
+              <a:schemeClr val="accent4"/>
+            </a:solidFill>
+            <a:round/>
+          </a:ln>
+        </p:spPr>
+        <p:style>
+          <a:lnRef idx="1">
+            <a:schemeClr val="accent1"/>
+          </a:lnRef>
+          <a:fillRef idx="0">
+            <a:schemeClr val="accent1"/>
+          </a:fillRef>
+          <a:effectRef idx="0">
+            <a:schemeClr val="accent1"/>
+          </a:effectRef>
+          <a:fontRef idx="minor"/>
+        </p:style>
+      </p:sp>
+      <p:sp>
+        <p:nvSpPr>
+          <p:cNvPr id="115" name="Line 24"/>
+          <p:cNvSpPr/>
+          <p:nvPr/>
+        </p:nvSpPr>
+        <p:spPr>
+          <a:xfrm>
+            <a:off x="10932120" y="4498200"/>
+            <a:ext cx="360" cy="122040"/>
+          </a:xfrm>
+          <a:prstGeom prst="line">
+            <a:avLst/>
+          </a:prstGeom>
+          <a:ln>
+            <a:round/>
+          </a:ln>
+        </p:spPr>
+        <p:style>
+          <a:lnRef idx="1">
+            <a:schemeClr val="accent1"/>
+          </a:lnRef>
+          <a:fillRef idx="0">
+            <a:schemeClr val="accent1"/>
+          </a:fillRef>
+          <a:effectRef idx="0">
+            <a:schemeClr val="accent1"/>
+          </a:effectRef>
+          <a:fontRef idx="minor"/>
+        </p:style>
+      </p:sp>
+      <p:sp>
+        <p:nvSpPr>
+          <p:cNvPr id="116" name="Line 25"/>
+          <p:cNvSpPr/>
+          <p:nvPr/>
+        </p:nvSpPr>
+        <p:spPr>
+          <a:xfrm>
+            <a:off x="9727920" y="4498200"/>
+            <a:ext cx="360" cy="119520"/>
+          </a:xfrm>
+          <a:prstGeom prst="line">
+            <a:avLst/>
+          </a:prstGeom>
+          <a:ln>
+            <a:round/>
+          </a:ln>
+        </p:spPr>
+        <p:style>
+          <a:lnRef idx="1">
+            <a:schemeClr val="accent1"/>
+          </a:lnRef>
+          <a:fillRef idx="0">
+            <a:schemeClr val="accent1"/>
+          </a:fillRef>
+          <a:effectRef idx="0">
+            <a:schemeClr val="accent1"/>
+          </a:effectRef>
+          <a:fontRef idx="minor"/>
+        </p:style>
+      </p:sp>
     </p:spTree>
   </p:cSld>
   <p:clrMapOvr>
@@ -8852,6 +8857,432 @@
 </file>
 
 <file path=ppt/slides/slide7.xml><?xml version="1.0" encoding="utf-8"?>
+<p:sld xmlns:a="http://schemas.openxmlformats.org/drawingml/2006/main" xmlns:r="http://schemas.openxmlformats.org/officeDocument/2006/relationships" xmlns:p="http://schemas.openxmlformats.org/presentationml/2006/main">
+  <p:cSld>
+    <p:spTree>
+      <p:nvGrpSpPr>
+        <p:cNvPr id="1" name=""/>
+        <p:cNvGrpSpPr/>
+        <p:nvPr/>
+      </p:nvGrpSpPr>
+      <p:grpSpPr>
+        <a:xfrm>
+          <a:off x="0" y="0"/>
+          <a:ext cx="0" cy="0"/>
+          <a:chOff x="0" y="0"/>
+          <a:chExt cx="0" cy="0"/>
+        </a:xfrm>
+      </p:grpSpPr>
+      <p:sp>
+        <p:nvSpPr>
+          <p:cNvPr id="124" name="TextShape 1"/>
+          <p:cNvSpPr txBox="1"/>
+          <p:nvPr/>
+        </p:nvSpPr>
+        <p:spPr>
+          <a:xfrm>
+            <a:off x="762120" y="559800"/>
+            <a:ext cx="3833640" cy="4952160"/>
+          </a:xfrm>
+          <a:prstGeom prst="rect">
+            <a:avLst/>
+          </a:prstGeom>
+          <a:noFill/>
+          <a:ln>
+            <a:noFill/>
+          </a:ln>
+        </p:spPr>
+        <p:txBody>
+          <a:bodyPr lIns="0" tIns="0" rIns="0" bIns="0" anchor="t"/>
+          <a:lstStyle/>
+          <a:p>
+            <a:pPr algn="r"/>
+            <a:r>
+              <a:rPr lang="en-US" sz="5000" b="0" i="1" strike="noStrike" spc="-1" dirty="0">
+                <a:solidFill>
+                  <a:srgbClr val="000000"/>
+                </a:solidFill>
+                <a:uFill>
+                  <a:solidFill>
+                    <a:srgbClr val="FFFFFF"/>
+                  </a:solidFill>
+                </a:uFill>
+                <a:latin typeface="Century Schoolbook" panose="02040604050505020304" pitchFamily="18" charset="0"/>
+              </a:rPr>
+              <a:t>Networking</a:t>
+            </a:r>
+          </a:p>
+        </p:txBody>
+      </p:sp>
+      <p:sp>
+        <p:nvSpPr>
+          <p:cNvPr id="125" name="TextShape 2"/>
+          <p:cNvSpPr txBox="1"/>
+          <p:nvPr/>
+        </p:nvSpPr>
+        <p:spPr>
+          <a:xfrm>
+            <a:off x="4595760" y="1772587"/>
+            <a:ext cx="6766560" cy="2526585"/>
+          </a:xfrm>
+          <a:prstGeom prst="rect">
+            <a:avLst/>
+          </a:prstGeom>
+          <a:noFill/>
+          <a:ln>
+            <a:noFill/>
+          </a:ln>
+        </p:spPr>
+        <p:txBody>
+          <a:bodyPr lIns="90000" tIns="45000" rIns="90000" bIns="45000"/>
+          <a:lstStyle/>
+          <a:p>
+            <a:pPr marL="216000" indent="-216000">
+              <a:buClr>
+                <a:srgbClr val="000000"/>
+              </a:buClr>
+              <a:buSzPct val="45000"/>
+              <a:buFont typeface="Wingdings" charset="2"/>
+              <a:buChar char=""/>
+            </a:pPr>
+            <a:r>
+              <a:rPr lang="en-US" sz="2000" b="0" strike="noStrike" spc="-1" dirty="0">
+                <a:solidFill>
+                  <a:srgbClr val="000000"/>
+                </a:solidFill>
+                <a:uFill>
+                  <a:solidFill>
+                    <a:srgbClr val="FFFFFF"/>
+                  </a:solidFill>
+                </a:uFill>
+                <a:latin typeface="Corbel" panose="020B0503020204020204" pitchFamily="34" charset="0"/>
+              </a:rPr>
+              <a:t>One player will host the game (act as a server), other players will act as clients</a:t>
+            </a:r>
+          </a:p>
+          <a:p>
+            <a:pPr marL="216000" indent="-216000">
+              <a:buClr>
+                <a:srgbClr val="000000"/>
+              </a:buClr>
+              <a:buSzPct val="45000"/>
+              <a:buFont typeface="Wingdings" charset="2"/>
+              <a:buChar char=""/>
+            </a:pPr>
+            <a:r>
+              <a:rPr lang="en-US" sz="2000" b="0" strike="noStrike" spc="-1" dirty="0">
+                <a:solidFill>
+                  <a:srgbClr val="000000"/>
+                </a:solidFill>
+                <a:uFill>
+                  <a:solidFill>
+                    <a:srgbClr val="FFFFFF"/>
+                  </a:solidFill>
+                </a:uFill>
+                <a:latin typeface="Corbel" panose="020B0503020204020204" pitchFamily="34" charset="0"/>
+              </a:rPr>
+              <a:t>Computer-Controlled Players (AI), Field Layout, and Items on the field will be controlled by the server</a:t>
+            </a:r>
+          </a:p>
+          <a:p>
+            <a:pPr marL="216000" indent="-216000">
+              <a:buClr>
+                <a:srgbClr val="000000"/>
+              </a:buClr>
+              <a:buSzPct val="45000"/>
+              <a:buFont typeface="Wingdings" charset="2"/>
+              <a:buChar char=""/>
+            </a:pPr>
+            <a:r>
+              <a:rPr lang="en-US" sz="2000" b="0" strike="noStrike" spc="-1" dirty="0">
+                <a:solidFill>
+                  <a:srgbClr val="000000"/>
+                </a:solidFill>
+                <a:uFill>
+                  <a:solidFill>
+                    <a:srgbClr val="FFFFFF"/>
+                  </a:solidFill>
+                </a:uFill>
+                <a:latin typeface="Corbel" panose="020B0503020204020204" pitchFamily="34" charset="0"/>
+              </a:rPr>
+              <a:t>Clients will only control their player and view the Game around them</a:t>
+            </a:r>
+          </a:p>
+          <a:p>
+            <a:pPr marL="216000" indent="-216000">
+              <a:buClr>
+                <a:srgbClr val="000000"/>
+              </a:buClr>
+              <a:buSzPct val="45000"/>
+              <a:buFont typeface="Wingdings" charset="2"/>
+              <a:buChar char=""/>
+            </a:pPr>
+            <a:r>
+              <a:rPr lang="en-US" sz="2000" b="0" strike="noStrike" spc="-1" dirty="0">
+                <a:solidFill>
+                  <a:srgbClr val="000000"/>
+                </a:solidFill>
+                <a:uFill>
+                  <a:solidFill>
+                    <a:srgbClr val="FFFFFF"/>
+                  </a:solidFill>
+                </a:uFill>
+                <a:latin typeface="Corbel" panose="020B0503020204020204" pitchFamily="34" charset="0"/>
+              </a:rPr>
+              <a:t>If in a single-player mode, Client and server will run on the same computer, and all other players will be controlled by AI</a:t>
+            </a:r>
+          </a:p>
+        </p:txBody>
+      </p:sp>
+    </p:spTree>
+  </p:cSld>
+  <p:clrMapOvr>
+    <a:masterClrMapping/>
+  </p:clrMapOvr>
+  <p:timing>
+    <p:tnLst>
+      <p:par>
+        <p:cTn id="1" dur="indefinite" restart="never" nodeType="tmRoot">
+          <p:childTnLst>
+            <p:seq>
+              <p:cTn id="2" nodeType="mainSeq"/>
+              <p:prevCondLst>
+                <p:cond evt="onPrev" delay="0">
+                  <p:tgtEl>
+                    <p:sldTgt/>
+                  </p:tgtEl>
+                </p:cond>
+              </p:prevCondLst>
+              <p:nextCondLst>
+                <p:cond evt="onNext" delay="0">
+                  <p:tgtEl>
+                    <p:sldTgt/>
+                  </p:tgtEl>
+                </p:cond>
+              </p:nextCondLst>
+            </p:seq>
+          </p:childTnLst>
+        </p:cTn>
+      </p:par>
+    </p:tnLst>
+  </p:timing>
+</p:sld>
+</file>
+
+<file path=ppt/slides/slide8.xml><?xml version="1.0" encoding="utf-8"?>
+<p:sld xmlns:a="http://schemas.openxmlformats.org/drawingml/2006/main" xmlns:r="http://schemas.openxmlformats.org/officeDocument/2006/relationships" xmlns:p="http://schemas.openxmlformats.org/presentationml/2006/main">
+  <p:cSld>
+    <p:spTree>
+      <p:nvGrpSpPr>
+        <p:cNvPr id="1" name=""/>
+        <p:cNvGrpSpPr/>
+        <p:nvPr/>
+      </p:nvGrpSpPr>
+      <p:grpSpPr>
+        <a:xfrm>
+          <a:off x="0" y="0"/>
+          <a:ext cx="0" cy="0"/>
+          <a:chOff x="0" y="0"/>
+          <a:chExt cx="0" cy="0"/>
+        </a:xfrm>
+      </p:grpSpPr>
+      <p:sp>
+        <p:nvSpPr>
+          <p:cNvPr id="122" name="TextShape 1"/>
+          <p:cNvSpPr txBox="1"/>
+          <p:nvPr/>
+        </p:nvSpPr>
+        <p:spPr>
+          <a:xfrm>
+            <a:off x="762120" y="559800"/>
+            <a:ext cx="3833640" cy="4952160"/>
+          </a:xfrm>
+          <a:prstGeom prst="rect">
+            <a:avLst/>
+          </a:prstGeom>
+          <a:noFill/>
+          <a:ln>
+            <a:noFill/>
+          </a:ln>
+        </p:spPr>
+        <p:txBody>
+          <a:bodyPr lIns="0" tIns="0" rIns="0" bIns="0" anchor="t"/>
+          <a:lstStyle/>
+          <a:p>
+            <a:pPr algn="r"/>
+            <a:r>
+              <a:rPr lang="en-US" sz="5000" b="0" i="1" strike="noStrike" spc="-1" dirty="0">
+                <a:solidFill>
+                  <a:srgbClr val="000000"/>
+                </a:solidFill>
+                <a:uFill>
+                  <a:solidFill>
+                    <a:srgbClr val="FFFFFF"/>
+                  </a:solidFill>
+                </a:uFill>
+                <a:latin typeface="Century Schoolbook" panose="02040604050505020304" pitchFamily="18" charset="0"/>
+              </a:rPr>
+              <a:t>Audio Design</a:t>
+            </a:r>
+          </a:p>
+        </p:txBody>
+      </p:sp>
+      <p:sp>
+        <p:nvSpPr>
+          <p:cNvPr id="123" name="TextShape 2"/>
+          <p:cNvSpPr txBox="1"/>
+          <p:nvPr/>
+        </p:nvSpPr>
+        <p:spPr>
+          <a:xfrm>
+            <a:off x="5128214" y="1766868"/>
+            <a:ext cx="6248160" cy="2538024"/>
+          </a:xfrm>
+          <a:prstGeom prst="rect">
+            <a:avLst/>
+          </a:prstGeom>
+          <a:noFill/>
+          <a:ln>
+            <a:noFill/>
+          </a:ln>
+        </p:spPr>
+        <p:txBody>
+          <a:bodyPr lIns="0" tIns="0" rIns="0" bIns="0" anchor="ctr"/>
+          <a:lstStyle/>
+          <a:p>
+            <a:pPr marL="432000" indent="-324000">
+              <a:buClr>
+                <a:srgbClr val="000000"/>
+              </a:buClr>
+              <a:buSzPct val="45000"/>
+              <a:buFont typeface="Wingdings" charset="2"/>
+              <a:buChar char=""/>
+            </a:pPr>
+            <a:r>
+              <a:rPr lang="en-US" sz="2000" b="0" strike="noStrike" spc="-1" dirty="0">
+                <a:solidFill>
+                  <a:srgbClr val="262626"/>
+                </a:solidFill>
+                <a:uFill>
+                  <a:solidFill>
+                    <a:srgbClr val="FFFFFF"/>
+                  </a:solidFill>
+                </a:uFill>
+                <a:latin typeface="Corbel"/>
+              </a:rPr>
+              <a:t>During the Battle Sequences, the focus will be on gameplay</a:t>
+            </a:r>
+          </a:p>
+          <a:p>
+            <a:pPr marL="432000" indent="-324000">
+              <a:buClr>
+                <a:srgbClr val="000000"/>
+              </a:buClr>
+              <a:buSzPct val="45000"/>
+              <a:buFont typeface="Wingdings" charset="2"/>
+              <a:buChar char=""/>
+            </a:pPr>
+            <a:r>
+              <a:rPr lang="en-US" sz="2000" b="0" strike="noStrike" spc="-1" dirty="0">
+                <a:solidFill>
+                  <a:srgbClr val="262626"/>
+                </a:solidFill>
+                <a:uFill>
+                  <a:solidFill>
+                    <a:srgbClr val="FFFFFF"/>
+                  </a:solidFill>
+                </a:uFill>
+                <a:latin typeface="Corbel"/>
+              </a:rPr>
+              <a:t>Sound Effects will be louder, music will be in the background</a:t>
+            </a:r>
+          </a:p>
+          <a:p>
+            <a:pPr marL="864000" lvl="1" indent="-324000">
+              <a:buClr>
+                <a:srgbClr val="000000"/>
+              </a:buClr>
+              <a:buSzPct val="75000"/>
+              <a:buFont typeface="Symbol" charset="2"/>
+              <a:buChar char=""/>
+            </a:pPr>
+            <a:r>
+              <a:rPr lang="en-US" sz="2000" b="0" strike="noStrike" spc="-1" dirty="0">
+                <a:solidFill>
+                  <a:srgbClr val="262626"/>
+                </a:solidFill>
+                <a:uFill>
+                  <a:solidFill>
+                    <a:srgbClr val="FFFFFF"/>
+                  </a:solidFill>
+                </a:uFill>
+                <a:latin typeface="Corbel"/>
+              </a:rPr>
+              <a:t>Battlefields are usually noisy with the sound effects</a:t>
+            </a:r>
+          </a:p>
+          <a:p>
+            <a:pPr marL="432000" indent="-324000">
+              <a:buClr>
+                <a:srgbClr val="000000"/>
+              </a:buClr>
+              <a:buSzPct val="45000"/>
+              <a:buFont typeface="Wingdings" charset="2"/>
+              <a:buChar char=""/>
+            </a:pPr>
+            <a:r>
+              <a:rPr lang="en-US" sz="2000" b="0" strike="noStrike" spc="-1" dirty="0">
+                <a:solidFill>
+                  <a:srgbClr val="262626"/>
+                </a:solidFill>
+                <a:uFill>
+                  <a:solidFill>
+                    <a:srgbClr val="FFFFFF"/>
+                  </a:solidFill>
+                </a:uFill>
+                <a:latin typeface="Corbel"/>
+              </a:rPr>
+              <a:t>Music will be more minimal and syncopated, but can swell when the player is close to an enemy or the match is about over or during other tense moments</a:t>
+            </a:r>
+          </a:p>
+        </p:txBody>
+      </p:sp>
+    </p:spTree>
+  </p:cSld>
+  <p:clrMapOvr>
+    <a:masterClrMapping/>
+  </p:clrMapOvr>
+  <p:timing>
+    <p:tnLst>
+      <p:par>
+        <p:cTn id="1" dur="indefinite" restart="never" nodeType="tmRoot">
+          <p:childTnLst>
+            <p:seq>
+              <p:cTn id="2" nodeType="mainSeq"/>
+              <p:prevCondLst>
+                <p:cond evt="onPrev" delay="0">
+                  <p:tgtEl>
+                    <p:sldTgt/>
+                  </p:tgtEl>
+                </p:cond>
+              </p:prevCondLst>
+              <p:nextCondLst>
+                <p:cond evt="onNext" delay="0">
+                  <p:tgtEl>
+                    <p:sldTgt/>
+                  </p:tgtEl>
+                </p:cond>
+              </p:nextCondLst>
+            </p:seq>
+          </p:childTnLst>
+        </p:cTn>
+      </p:par>
+    </p:tnLst>
+  </p:timing>
+</p:sld>
+</file>
+
+<file path=ppt/slides/slide9.xml><?xml version="1.0" encoding="utf-8"?>
 <p:sld xmlns:a="http://schemas.openxmlformats.org/drawingml/2006/main" xmlns:r="http://schemas.openxmlformats.org/officeDocument/2006/relationships" xmlns:p="http://schemas.openxmlformats.org/presentationml/2006/main">
   <p:cSld>
     <p:spTree>
@@ -10674,7 +11105,7 @@
                         </a:lnSpc>
                       </a:pPr>
                       <a:r>
-                        <a:rPr lang="en-US" sz="1800" b="0" strike="noStrike" spc="-1">
+                        <a:rPr lang="en-US" sz="1800" b="0" strike="noStrike" spc="-1" dirty="0">
                           <a:solidFill>
                             <a:srgbClr val="000000"/>
                           </a:solidFill>
@@ -10687,7 +11118,7 @@
                         </a:rPr>
                         <a:t>Phase 6</a:t>
                       </a:r>
-                      <a:endParaRPr lang="en-US" sz="1800" b="0" strike="noStrike" spc="-1">
+                      <a:endParaRPr lang="en-US" sz="1800" b="0" strike="noStrike" spc="-1" dirty="0">
                         <a:solidFill>
                           <a:srgbClr val="000000"/>
                         </a:solidFill>
@@ -10891,7 +11322,7 @@
                         </a:lnSpc>
                       </a:pPr>
                       <a:r>
-                        <a:rPr lang="en-US" sz="1800" b="0" strike="noStrike" spc="-1">
+                        <a:rPr lang="en-US" sz="1800" b="0" strike="noStrike" spc="-1" dirty="0">
                           <a:solidFill>
                             <a:srgbClr val="000000"/>
                           </a:solidFill>
@@ -10904,7 +11335,7 @@
                         </a:rPr>
                         <a:t>Refine</a:t>
                       </a:r>
-                      <a:endParaRPr lang="en-US" sz="1800" b="0" strike="noStrike" spc="-1">
+                      <a:endParaRPr lang="en-US" sz="1800" b="0" strike="noStrike" spc="-1" dirty="0">
                         <a:solidFill>
                           <a:srgbClr val="000000"/>
                         </a:solidFill>
@@ -10953,432 +11384,6 @@
           </a:graphicData>
         </a:graphic>
       </p:graphicFrame>
-    </p:spTree>
-  </p:cSld>
-  <p:clrMapOvr>
-    <a:masterClrMapping/>
-  </p:clrMapOvr>
-  <p:timing>
-    <p:tnLst>
-      <p:par>
-        <p:cTn id="1" dur="indefinite" restart="never" nodeType="tmRoot">
-          <p:childTnLst>
-            <p:seq>
-              <p:cTn id="2" nodeType="mainSeq"/>
-              <p:prevCondLst>
-                <p:cond evt="onPrev" delay="0">
-                  <p:tgtEl>
-                    <p:sldTgt/>
-                  </p:tgtEl>
-                </p:cond>
-              </p:prevCondLst>
-              <p:nextCondLst>
-                <p:cond evt="onNext" delay="0">
-                  <p:tgtEl>
-                    <p:sldTgt/>
-                  </p:tgtEl>
-                </p:cond>
-              </p:nextCondLst>
-            </p:seq>
-          </p:childTnLst>
-        </p:cTn>
-      </p:par>
-    </p:tnLst>
-  </p:timing>
-</p:sld>
-</file>
-
-<file path=ppt/slides/slide8.xml><?xml version="1.0" encoding="utf-8"?>
-<p:sld xmlns:a="http://schemas.openxmlformats.org/drawingml/2006/main" xmlns:r="http://schemas.openxmlformats.org/officeDocument/2006/relationships" xmlns:p="http://schemas.openxmlformats.org/presentationml/2006/main">
-  <p:cSld>
-    <p:spTree>
-      <p:nvGrpSpPr>
-        <p:cNvPr id="1" name=""/>
-        <p:cNvGrpSpPr/>
-        <p:nvPr/>
-      </p:nvGrpSpPr>
-      <p:grpSpPr>
-        <a:xfrm>
-          <a:off x="0" y="0"/>
-          <a:ext cx="0" cy="0"/>
-          <a:chOff x="0" y="0"/>
-          <a:chExt cx="0" cy="0"/>
-        </a:xfrm>
-      </p:grpSpPr>
-      <p:sp>
-        <p:nvSpPr>
-          <p:cNvPr id="122" name="TextShape 1"/>
-          <p:cNvSpPr txBox="1"/>
-          <p:nvPr/>
-        </p:nvSpPr>
-        <p:spPr>
-          <a:xfrm>
-            <a:off x="762120" y="559800"/>
-            <a:ext cx="3833640" cy="4952160"/>
-          </a:xfrm>
-          <a:prstGeom prst="rect">
-            <a:avLst/>
-          </a:prstGeom>
-          <a:noFill/>
-          <a:ln>
-            <a:noFill/>
-          </a:ln>
-        </p:spPr>
-        <p:txBody>
-          <a:bodyPr lIns="0" tIns="0" rIns="0" bIns="0" anchor="t"/>
-          <a:lstStyle/>
-          <a:p>
-            <a:pPr algn="r"/>
-            <a:r>
-              <a:rPr lang="en-US" sz="5000" b="0" i="1" strike="noStrike" spc="-1" dirty="0">
-                <a:solidFill>
-                  <a:srgbClr val="000000"/>
-                </a:solidFill>
-                <a:uFill>
-                  <a:solidFill>
-                    <a:srgbClr val="FFFFFF"/>
-                  </a:solidFill>
-                </a:uFill>
-                <a:latin typeface="Century Schoolbook" panose="02040604050505020304" pitchFamily="18" charset="0"/>
-              </a:rPr>
-              <a:t>Audio Design</a:t>
-            </a:r>
-          </a:p>
-        </p:txBody>
-      </p:sp>
-      <p:sp>
-        <p:nvSpPr>
-          <p:cNvPr id="123" name="TextShape 2"/>
-          <p:cNvSpPr txBox="1"/>
-          <p:nvPr/>
-        </p:nvSpPr>
-        <p:spPr>
-          <a:xfrm>
-            <a:off x="5128214" y="1766868"/>
-            <a:ext cx="6248160" cy="2538024"/>
-          </a:xfrm>
-          <a:prstGeom prst="rect">
-            <a:avLst/>
-          </a:prstGeom>
-          <a:noFill/>
-          <a:ln>
-            <a:noFill/>
-          </a:ln>
-        </p:spPr>
-        <p:txBody>
-          <a:bodyPr lIns="0" tIns="0" rIns="0" bIns="0" anchor="ctr"/>
-          <a:lstStyle/>
-          <a:p>
-            <a:pPr marL="432000" indent="-324000">
-              <a:buClr>
-                <a:srgbClr val="000000"/>
-              </a:buClr>
-              <a:buSzPct val="45000"/>
-              <a:buFont typeface="Wingdings" charset="2"/>
-              <a:buChar char=""/>
-            </a:pPr>
-            <a:r>
-              <a:rPr lang="en-US" sz="2000" b="0" strike="noStrike" spc="-1" dirty="0">
-                <a:solidFill>
-                  <a:srgbClr val="262626"/>
-                </a:solidFill>
-                <a:uFill>
-                  <a:solidFill>
-                    <a:srgbClr val="FFFFFF"/>
-                  </a:solidFill>
-                </a:uFill>
-                <a:latin typeface="Corbel"/>
-              </a:rPr>
-              <a:t>During the Battle Sequences, the focus will be on gameplay</a:t>
-            </a:r>
-          </a:p>
-          <a:p>
-            <a:pPr marL="432000" indent="-324000">
-              <a:buClr>
-                <a:srgbClr val="000000"/>
-              </a:buClr>
-              <a:buSzPct val="45000"/>
-              <a:buFont typeface="Wingdings" charset="2"/>
-              <a:buChar char=""/>
-            </a:pPr>
-            <a:r>
-              <a:rPr lang="en-US" sz="2000" b="0" strike="noStrike" spc="-1" dirty="0">
-                <a:solidFill>
-                  <a:srgbClr val="262626"/>
-                </a:solidFill>
-                <a:uFill>
-                  <a:solidFill>
-                    <a:srgbClr val="FFFFFF"/>
-                  </a:solidFill>
-                </a:uFill>
-                <a:latin typeface="Corbel"/>
-              </a:rPr>
-              <a:t>Sound Effects will be louder, music will be in the background</a:t>
-            </a:r>
-          </a:p>
-          <a:p>
-            <a:pPr marL="864000" lvl="1" indent="-324000">
-              <a:buClr>
-                <a:srgbClr val="000000"/>
-              </a:buClr>
-              <a:buSzPct val="75000"/>
-              <a:buFont typeface="Symbol" charset="2"/>
-              <a:buChar char=""/>
-            </a:pPr>
-            <a:r>
-              <a:rPr lang="en-US" sz="2000" b="0" strike="noStrike" spc="-1" dirty="0">
-                <a:solidFill>
-                  <a:srgbClr val="262626"/>
-                </a:solidFill>
-                <a:uFill>
-                  <a:solidFill>
-                    <a:srgbClr val="FFFFFF"/>
-                  </a:solidFill>
-                </a:uFill>
-                <a:latin typeface="Corbel"/>
-              </a:rPr>
-              <a:t>Battlefields are usually noisy with the sound effects</a:t>
-            </a:r>
-          </a:p>
-          <a:p>
-            <a:pPr marL="432000" indent="-324000">
-              <a:buClr>
-                <a:srgbClr val="000000"/>
-              </a:buClr>
-              <a:buSzPct val="45000"/>
-              <a:buFont typeface="Wingdings" charset="2"/>
-              <a:buChar char=""/>
-            </a:pPr>
-            <a:r>
-              <a:rPr lang="en-US" sz="2000" b="0" strike="noStrike" spc="-1" dirty="0">
-                <a:solidFill>
-                  <a:srgbClr val="262626"/>
-                </a:solidFill>
-                <a:uFill>
-                  <a:solidFill>
-                    <a:srgbClr val="FFFFFF"/>
-                  </a:solidFill>
-                </a:uFill>
-                <a:latin typeface="Corbel"/>
-              </a:rPr>
-              <a:t>Music will be more minimal and syncopated, but can swell when the player is close to an enemy or the match is about over or during other tense moments</a:t>
-            </a:r>
-          </a:p>
-        </p:txBody>
-      </p:sp>
-    </p:spTree>
-  </p:cSld>
-  <p:clrMapOvr>
-    <a:masterClrMapping/>
-  </p:clrMapOvr>
-  <p:timing>
-    <p:tnLst>
-      <p:par>
-        <p:cTn id="1" dur="indefinite" restart="never" nodeType="tmRoot">
-          <p:childTnLst>
-            <p:seq>
-              <p:cTn id="2" nodeType="mainSeq"/>
-              <p:prevCondLst>
-                <p:cond evt="onPrev" delay="0">
-                  <p:tgtEl>
-                    <p:sldTgt/>
-                  </p:tgtEl>
-                </p:cond>
-              </p:prevCondLst>
-              <p:nextCondLst>
-                <p:cond evt="onNext" delay="0">
-                  <p:tgtEl>
-                    <p:sldTgt/>
-                  </p:tgtEl>
-                </p:cond>
-              </p:nextCondLst>
-            </p:seq>
-          </p:childTnLst>
-        </p:cTn>
-      </p:par>
-    </p:tnLst>
-  </p:timing>
-</p:sld>
-</file>
-
-<file path=ppt/slides/slide9.xml><?xml version="1.0" encoding="utf-8"?>
-<p:sld xmlns:a="http://schemas.openxmlformats.org/drawingml/2006/main" xmlns:r="http://schemas.openxmlformats.org/officeDocument/2006/relationships" xmlns:p="http://schemas.openxmlformats.org/presentationml/2006/main">
-  <p:cSld>
-    <p:spTree>
-      <p:nvGrpSpPr>
-        <p:cNvPr id="1" name=""/>
-        <p:cNvGrpSpPr/>
-        <p:nvPr/>
-      </p:nvGrpSpPr>
-      <p:grpSpPr>
-        <a:xfrm>
-          <a:off x="0" y="0"/>
-          <a:ext cx="0" cy="0"/>
-          <a:chOff x="0" y="0"/>
-          <a:chExt cx="0" cy="0"/>
-        </a:xfrm>
-      </p:grpSpPr>
-      <p:sp>
-        <p:nvSpPr>
-          <p:cNvPr id="124" name="TextShape 1"/>
-          <p:cNvSpPr txBox="1"/>
-          <p:nvPr/>
-        </p:nvSpPr>
-        <p:spPr>
-          <a:xfrm>
-            <a:off x="762120" y="559800"/>
-            <a:ext cx="3833640" cy="4952160"/>
-          </a:xfrm>
-          <a:prstGeom prst="rect">
-            <a:avLst/>
-          </a:prstGeom>
-          <a:noFill/>
-          <a:ln>
-            <a:noFill/>
-          </a:ln>
-        </p:spPr>
-        <p:txBody>
-          <a:bodyPr lIns="0" tIns="0" rIns="0" bIns="0" anchor="t"/>
-          <a:lstStyle/>
-          <a:p>
-            <a:pPr algn="r"/>
-            <a:r>
-              <a:rPr lang="en-US" sz="5000" b="0" i="1" strike="noStrike" spc="-1" dirty="0">
-                <a:solidFill>
-                  <a:srgbClr val="000000"/>
-                </a:solidFill>
-                <a:uFill>
-                  <a:solidFill>
-                    <a:srgbClr val="FFFFFF"/>
-                  </a:solidFill>
-                </a:uFill>
-                <a:latin typeface="Century Schoolbook" panose="02040604050505020304" pitchFamily="18" charset="0"/>
-              </a:rPr>
-              <a:t>Networking</a:t>
-            </a:r>
-          </a:p>
-        </p:txBody>
-      </p:sp>
-      <p:sp>
-        <p:nvSpPr>
-          <p:cNvPr id="125" name="TextShape 2"/>
-          <p:cNvSpPr txBox="1"/>
-          <p:nvPr/>
-        </p:nvSpPr>
-        <p:spPr>
-          <a:xfrm>
-            <a:off x="4595760" y="1772587"/>
-            <a:ext cx="6766560" cy="2526585"/>
-          </a:xfrm>
-          <a:prstGeom prst="rect">
-            <a:avLst/>
-          </a:prstGeom>
-          <a:noFill/>
-          <a:ln>
-            <a:noFill/>
-          </a:ln>
-        </p:spPr>
-        <p:txBody>
-          <a:bodyPr lIns="90000" tIns="45000" rIns="90000" bIns="45000"/>
-          <a:lstStyle/>
-          <a:p>
-            <a:pPr marL="216000" indent="-216000">
-              <a:buClr>
-                <a:srgbClr val="000000"/>
-              </a:buClr>
-              <a:buSzPct val="45000"/>
-              <a:buFont typeface="Wingdings" charset="2"/>
-              <a:buChar char=""/>
-            </a:pPr>
-            <a:r>
-              <a:rPr lang="en-US" sz="2000" b="0" strike="noStrike" spc="-1" dirty="0">
-                <a:solidFill>
-                  <a:srgbClr val="000000"/>
-                </a:solidFill>
-                <a:uFill>
-                  <a:solidFill>
-                    <a:srgbClr val="FFFFFF"/>
-                  </a:solidFill>
-                </a:uFill>
-                <a:latin typeface="Corbel" panose="020B0503020204020204" pitchFamily="34" charset="0"/>
-              </a:rPr>
-              <a:t>One player will host the game (act as a server), other players will act as clients</a:t>
-            </a:r>
-          </a:p>
-          <a:p>
-            <a:pPr marL="216000" indent="-216000">
-              <a:buClr>
-                <a:srgbClr val="000000"/>
-              </a:buClr>
-              <a:buSzPct val="45000"/>
-              <a:buFont typeface="Wingdings" charset="2"/>
-              <a:buChar char=""/>
-            </a:pPr>
-            <a:r>
-              <a:rPr lang="en-US" sz="2000" b="0" strike="noStrike" spc="-1" dirty="0">
-                <a:solidFill>
-                  <a:srgbClr val="000000"/>
-                </a:solidFill>
-                <a:uFill>
-                  <a:solidFill>
-                    <a:srgbClr val="FFFFFF"/>
-                  </a:solidFill>
-                </a:uFill>
-                <a:latin typeface="Corbel" panose="020B0503020204020204" pitchFamily="34" charset="0"/>
-              </a:rPr>
-              <a:t>Computer-Controlled Players (AI), Field Layout, and Items on the field will be controlled by the server</a:t>
-            </a:r>
-          </a:p>
-          <a:p>
-            <a:pPr marL="216000" indent="-216000">
-              <a:buClr>
-                <a:srgbClr val="000000"/>
-              </a:buClr>
-              <a:buSzPct val="45000"/>
-              <a:buFont typeface="Wingdings" charset="2"/>
-              <a:buChar char=""/>
-            </a:pPr>
-            <a:r>
-              <a:rPr lang="en-US" sz="2000" b="0" strike="noStrike" spc="-1" dirty="0">
-                <a:solidFill>
-                  <a:srgbClr val="000000"/>
-                </a:solidFill>
-                <a:uFill>
-                  <a:solidFill>
-                    <a:srgbClr val="FFFFFF"/>
-                  </a:solidFill>
-                </a:uFill>
-                <a:latin typeface="Corbel" panose="020B0503020204020204" pitchFamily="34" charset="0"/>
-              </a:rPr>
-              <a:t>Clients will only control their player and view the Game around them</a:t>
-            </a:r>
-          </a:p>
-          <a:p>
-            <a:pPr marL="216000" indent="-216000">
-              <a:buClr>
-                <a:srgbClr val="000000"/>
-              </a:buClr>
-              <a:buSzPct val="45000"/>
-              <a:buFont typeface="Wingdings" charset="2"/>
-              <a:buChar char=""/>
-            </a:pPr>
-            <a:r>
-              <a:rPr lang="en-US" sz="2000" b="0" strike="noStrike" spc="-1" dirty="0">
-                <a:solidFill>
-                  <a:srgbClr val="000000"/>
-                </a:solidFill>
-                <a:uFill>
-                  <a:solidFill>
-                    <a:srgbClr val="FFFFFF"/>
-                  </a:solidFill>
-                </a:uFill>
-                <a:latin typeface="Corbel" panose="020B0503020204020204" pitchFamily="34" charset="0"/>
-              </a:rPr>
-              <a:t>If in a single-player mode, Client and server will run on the same computer, and all other players will be controlled by AI</a:t>
-            </a:r>
-          </a:p>
-        </p:txBody>
-      </p:sp>
     </p:spTree>
   </p:cSld>
   <p:clrMapOvr>

</xml_diff>